<commit_message>
Actualización de los contenidos
</commit_message>
<xml_diff>
--- a/06 - IS - Administracion de la configuración .pptx
+++ b/06 - IS - Administracion de la configuración .pptx
@@ -165,16 +165,57 @@
 </p:cmAuthorLst>
 </file>
 
-<file path=ppt/revisionInfo.xml><?xml version="1.0" encoding="utf-8"?>
-<p1510:revInfo xmlns:a="http://schemas.openxmlformats.org/drawingml/2006/main" xmlns:r="http://schemas.openxmlformats.org/officeDocument/2006/relationships" xmlns:p1510="http://schemas.microsoft.com/office/powerpoint/2015/10/main">
-  <p1510:revLst>
-    <p1510:client id="{9FE5FF6C-FF80-3A42-8EBA-5C9015AF763A}" v="29" dt="2019-04-24T22:38:06.158"/>
-  </p1510:revLst>
-</p1510:revInfo>
-</file>
-
 <file path=ppt/changesInfos/changesInfo1.xml><?xml version="1.0" encoding="utf-8"?>
 <pc:chgInfo xmlns:a="http://schemas.openxmlformats.org/drawingml/2006/main" xmlns:r="http://schemas.openxmlformats.org/officeDocument/2006/relationships" xmlns:ac="http://schemas.microsoft.com/office/drawing/2013/main/command" xmlns:pc="http://schemas.microsoft.com/office/powerpoint/2013/main/command">
+  <pc:docChgLst>
+    <pc:chgData name="Victor Valotto" userId="f8cd04a3a901a375" providerId="LiveId" clId="{9FE5FF6C-FF80-3A42-8EBA-5C9015AF763A}"/>
+    <pc:docChg chg="undo custSel addSld delSld modSld modMainMaster">
+      <pc:chgData name="Victor Valotto" userId="f8cd04a3a901a375" providerId="LiveId" clId="{9FE5FF6C-FF80-3A42-8EBA-5C9015AF763A}" dt="2019-04-24T22:38:09.399" v="287" actId="2696"/>
+      <pc:docMkLst>
+        <pc:docMk/>
+      </pc:docMkLst>
+      <pc:sldMasterChg chg="delSldLayout modSldLayout">
+        <pc:chgData name="Victor Valotto" userId="f8cd04a3a901a375" providerId="LiveId" clId="{9FE5FF6C-FF80-3A42-8EBA-5C9015AF763A}" dt="2019-04-24T22:36:17.051" v="284" actId="2696"/>
+        <pc:sldMasterMkLst>
+          <pc:docMk/>
+          <pc:sldMasterMk cId="0" sldId="2147483840"/>
+        </pc:sldMasterMkLst>
+      </pc:sldMasterChg>
+    </pc:docChg>
+  </pc:docChgLst>
+  <pc:docChgLst>
+    <pc:chgData name="Victor Valotto" userId="f8cd04a3a901a375" providerId="LiveId" clId="{5A345204-3C57-C94C-B1A3-E23824FCEA03}"/>
+    <pc:docChg chg="undo custSel addSld delSld modSld">
+      <pc:chgData name="Victor Valotto" userId="f8cd04a3a901a375" providerId="LiveId" clId="{5A345204-3C57-C94C-B1A3-E23824FCEA03}" dt="2019-04-16T20:07:52.625" v="220" actId="1076"/>
+      <pc:docMkLst>
+        <pc:docMk/>
+      </pc:docMkLst>
+    </pc:docChg>
+  </pc:docChgLst>
+  <pc:docChgLst>
+    <pc:chgData name="Victor Valotto" userId="f8cd04a3a901a375" providerId="LiveId" clId="{D8253574-1F1D-A54A-8107-1243FF27A437}"/>
+    <pc:docChg chg="modSld">
+      <pc:chgData name="Victor Valotto" userId="f8cd04a3a901a375" providerId="LiveId" clId="{D8253574-1F1D-A54A-8107-1243FF27A437}" dt="2019-06-02T20:06:26.880" v="39" actId="20577"/>
+      <pc:docMkLst>
+        <pc:docMk/>
+      </pc:docMkLst>
+      <pc:sldChg chg="modSp">
+        <pc:chgData name="Victor Valotto" userId="f8cd04a3a901a375" providerId="LiveId" clId="{D8253574-1F1D-A54A-8107-1243FF27A437}" dt="2019-06-02T20:06:26.880" v="39" actId="20577"/>
+        <pc:sldMkLst>
+          <pc:docMk/>
+          <pc:sldMk cId="4143034434" sldId="256"/>
+        </pc:sldMkLst>
+        <pc:spChg chg="mod">
+          <ac:chgData name="Victor Valotto" userId="f8cd04a3a901a375" providerId="LiveId" clId="{D8253574-1F1D-A54A-8107-1243FF27A437}" dt="2019-06-02T20:06:26.880" v="39" actId="20577"/>
+          <ac:spMkLst>
+            <pc:docMk/>
+            <pc:sldMk cId="4143034434" sldId="256"/>
+            <ac:spMk id="2" creationId="{E87BCC9F-5D7D-FF4D-8BE0-02DB4CF4979F}"/>
+          </ac:spMkLst>
+        </pc:spChg>
+      </pc:sldChg>
+    </pc:docChg>
+  </pc:docChgLst>
   <pc:docChgLst>
     <pc:chgData name="Victor Valotto" userId="f8cd04a3a901a375" providerId="LiveId" clId="{B3EC4247-3503-F34F-B457-B7E68ADEB118}"/>
     <pc:docChg chg="custSel addSld delSld modSld">
@@ -189,1532 +230,6 @@
           <pc:sldMasterMk cId="0" sldId="2147483840"/>
         </pc:sldMasterMkLst>
       </pc:sldMasterChg>
-    </pc:docChg>
-  </pc:docChgLst>
-  <pc:docChgLst>
-    <pc:chgData name="Victor Valotto" userId="f8cd04a3a901a375" providerId="LiveId" clId="{9FE5FF6C-FF80-3A42-8EBA-5C9015AF763A}"/>
-    <pc:docChg chg="undo custSel addSld delSld modSld modMainMaster">
-      <pc:chgData name="Victor Valotto" userId="f8cd04a3a901a375" providerId="LiveId" clId="{9FE5FF6C-FF80-3A42-8EBA-5C9015AF763A}" dt="2019-04-24T22:38:09.399" v="287" actId="2696"/>
-      <pc:docMkLst>
-        <pc:docMk/>
-      </pc:docMkLst>
-      <pc:sldChg chg="modSp add">
-        <pc:chgData name="Victor Valotto" userId="f8cd04a3a901a375" providerId="LiveId" clId="{9FE5FF6C-FF80-3A42-8EBA-5C9015AF763A}" dt="2019-04-24T21:25:39.074" v="118" actId="20577"/>
-        <pc:sldMkLst>
-          <pc:docMk/>
-          <pc:sldMk cId="2729765872" sldId="291"/>
-        </pc:sldMkLst>
-        <pc:spChg chg="mod">
-          <ac:chgData name="Victor Valotto" userId="f8cd04a3a901a375" providerId="LiveId" clId="{9FE5FF6C-FF80-3A42-8EBA-5C9015AF763A}" dt="2019-04-24T21:24:46.422" v="110" actId="14100"/>
-          <ac:spMkLst>
-            <pc:docMk/>
-            <pc:sldMk cId="2729765872" sldId="291"/>
-            <ac:spMk id="10243" creationId="{A76441D9-4480-FA4A-A925-16773BDE3735}"/>
-          </ac:spMkLst>
-        </pc:spChg>
-        <pc:spChg chg="mod">
-          <ac:chgData name="Victor Valotto" userId="f8cd04a3a901a375" providerId="LiveId" clId="{9FE5FF6C-FF80-3A42-8EBA-5C9015AF763A}" dt="2019-04-24T21:25:39.074" v="118" actId="20577"/>
-          <ac:spMkLst>
-            <pc:docMk/>
-            <pc:sldMk cId="2729765872" sldId="291"/>
-            <ac:spMk id="10244" creationId="{F1FA67E5-6162-4144-A0C4-6574E3B26B7A}"/>
-          </ac:spMkLst>
-        </pc:spChg>
-        <pc:spChg chg="mod">
-          <ac:chgData name="Victor Valotto" userId="f8cd04a3a901a375" providerId="LiveId" clId="{9FE5FF6C-FF80-3A42-8EBA-5C9015AF763A}" dt="2019-04-24T21:25:09.373" v="113" actId="1076"/>
-          <ac:spMkLst>
-            <pc:docMk/>
-            <pc:sldMk cId="2729765872" sldId="291"/>
-            <ac:spMk id="10245" creationId="{B31BD98E-7D09-2E45-BF66-116EB6011441}"/>
-          </ac:spMkLst>
-        </pc:spChg>
-        <pc:spChg chg="mod">
-          <ac:chgData name="Victor Valotto" userId="f8cd04a3a901a375" providerId="LiveId" clId="{9FE5FF6C-FF80-3A42-8EBA-5C9015AF763A}" dt="2019-04-24T21:25:09.373" v="113" actId="1076"/>
-          <ac:spMkLst>
-            <pc:docMk/>
-            <pc:sldMk cId="2729765872" sldId="291"/>
-            <ac:spMk id="10246" creationId="{DDFA7192-7984-BB48-BB46-7DE504F862CC}"/>
-          </ac:spMkLst>
-        </pc:spChg>
-      </pc:sldChg>
-      <pc:sldChg chg="add">
-        <pc:chgData name="Victor Valotto" userId="f8cd04a3a901a375" providerId="LiveId" clId="{9FE5FF6C-FF80-3A42-8EBA-5C9015AF763A}" dt="2019-04-24T22:13:32.159" v="274"/>
-        <pc:sldMkLst>
-          <pc:docMk/>
-          <pc:sldMk cId="4172141217" sldId="299"/>
-        </pc:sldMkLst>
-      </pc:sldChg>
-      <pc:sldChg chg="modSp add">
-        <pc:chgData name="Victor Valotto" userId="f8cd04a3a901a375" providerId="LiveId" clId="{9FE5FF6C-FF80-3A42-8EBA-5C9015AF763A}" dt="2019-04-24T21:55:54.564" v="206" actId="1076"/>
-        <pc:sldMkLst>
-          <pc:docMk/>
-          <pc:sldMk cId="3695237534" sldId="301"/>
-        </pc:sldMkLst>
-        <pc:spChg chg="mod">
-          <ac:chgData name="Victor Valotto" userId="f8cd04a3a901a375" providerId="LiveId" clId="{9FE5FF6C-FF80-3A42-8EBA-5C9015AF763A}" dt="2019-04-24T21:55:54.564" v="206" actId="1076"/>
-          <ac:spMkLst>
-            <pc:docMk/>
-            <pc:sldMk cId="3695237534" sldId="301"/>
-            <ac:spMk id="3" creationId="{2E8F00DD-6088-3846-8206-05DCC365FD43}"/>
-          </ac:spMkLst>
-        </pc:spChg>
-        <pc:spChg chg="mod">
-          <ac:chgData name="Victor Valotto" userId="f8cd04a3a901a375" providerId="LiveId" clId="{9FE5FF6C-FF80-3A42-8EBA-5C9015AF763A}" dt="2019-04-24T21:55:50.614" v="204" actId="1076"/>
-          <ac:spMkLst>
-            <pc:docMk/>
-            <pc:sldMk cId="3695237534" sldId="301"/>
-            <ac:spMk id="13314" creationId="{E80B6BED-9B4B-684A-9BB9-47F22C80266D}"/>
-          </ac:spMkLst>
-        </pc:spChg>
-      </pc:sldChg>
-      <pc:sldChg chg="modSp add">
-        <pc:chgData name="Victor Valotto" userId="f8cd04a3a901a375" providerId="LiveId" clId="{9FE5FF6C-FF80-3A42-8EBA-5C9015AF763A}" dt="2019-04-24T21:55:42.582" v="202" actId="1076"/>
-        <pc:sldMkLst>
-          <pc:docMk/>
-          <pc:sldMk cId="1263550085" sldId="302"/>
-        </pc:sldMkLst>
-        <pc:spChg chg="mod">
-          <ac:chgData name="Victor Valotto" userId="f8cd04a3a901a375" providerId="LiveId" clId="{9FE5FF6C-FF80-3A42-8EBA-5C9015AF763A}" dt="2019-04-24T21:55:38.477" v="200" actId="1076"/>
-          <ac:spMkLst>
-            <pc:docMk/>
-            <pc:sldMk cId="1263550085" sldId="302"/>
-            <ac:spMk id="3" creationId="{A86001F2-315C-9549-86D6-5C60A72B96F4}"/>
-          </ac:spMkLst>
-        </pc:spChg>
-        <pc:spChg chg="mod">
-          <ac:chgData name="Victor Valotto" userId="f8cd04a3a901a375" providerId="LiveId" clId="{9FE5FF6C-FF80-3A42-8EBA-5C9015AF763A}" dt="2019-04-24T21:55:30.747" v="198" actId="14100"/>
-          <ac:spMkLst>
-            <pc:docMk/>
-            <pc:sldMk cId="1263550085" sldId="302"/>
-            <ac:spMk id="12291" creationId="{900A0159-1E4C-D841-B552-9EDDACC3FBCC}"/>
-          </ac:spMkLst>
-        </pc:spChg>
-        <pc:picChg chg="mod">
-          <ac:chgData name="Victor Valotto" userId="f8cd04a3a901a375" providerId="LiveId" clId="{9FE5FF6C-FF80-3A42-8EBA-5C9015AF763A}" dt="2019-04-24T21:55:42.582" v="202" actId="1076"/>
-          <ac:picMkLst>
-            <pc:docMk/>
-            <pc:sldMk cId="1263550085" sldId="302"/>
-            <ac:picMk id="12290" creationId="{20B5193F-2F6E-C747-B1AF-9C8AACD6E33A}"/>
-          </ac:picMkLst>
-        </pc:picChg>
-      </pc:sldChg>
-      <pc:sldChg chg="modSp add del">
-        <pc:chgData name="Victor Valotto" userId="f8cd04a3a901a375" providerId="LiveId" clId="{9FE5FF6C-FF80-3A42-8EBA-5C9015AF763A}" dt="2019-04-24T21:56:19.103" v="208" actId="2696"/>
-        <pc:sldMkLst>
-          <pc:docMk/>
-          <pc:sldMk cId="2484154390" sldId="303"/>
-        </pc:sldMkLst>
-        <pc:spChg chg="mod">
-          <ac:chgData name="Victor Valotto" userId="f8cd04a3a901a375" providerId="LiveId" clId="{9FE5FF6C-FF80-3A42-8EBA-5C9015AF763A}" dt="2019-04-24T21:56:06.038" v="207" actId="14100"/>
-          <ac:spMkLst>
-            <pc:docMk/>
-            <pc:sldMk cId="2484154390" sldId="303"/>
-            <ac:spMk id="14338" creationId="{127D3609-1F56-F34A-AFA4-0743F29B1E66}"/>
-          </ac:spMkLst>
-        </pc:spChg>
-      </pc:sldChg>
-      <pc:sldChg chg="add">
-        <pc:chgData name="Victor Valotto" userId="f8cd04a3a901a375" providerId="LiveId" clId="{9FE5FF6C-FF80-3A42-8EBA-5C9015AF763A}" dt="2019-04-24T22:13:36.302" v="275"/>
-        <pc:sldMkLst>
-          <pc:docMk/>
-          <pc:sldMk cId="3408455487" sldId="303"/>
-        </pc:sldMkLst>
-      </pc:sldChg>
-      <pc:sldChg chg="delSp modSp add">
-        <pc:chgData name="Victor Valotto" userId="f8cd04a3a901a375" providerId="LiveId" clId="{9FE5FF6C-FF80-3A42-8EBA-5C9015AF763A}" dt="2019-04-24T21:57:00.309" v="220" actId="1076"/>
-        <pc:sldMkLst>
-          <pc:docMk/>
-          <pc:sldMk cId="3381973727" sldId="304"/>
-        </pc:sldMkLst>
-        <pc:spChg chg="mod">
-          <ac:chgData name="Victor Valotto" userId="f8cd04a3a901a375" providerId="LiveId" clId="{9FE5FF6C-FF80-3A42-8EBA-5C9015AF763A}" dt="2019-04-24T21:56:55.359" v="217" actId="1076"/>
-          <ac:spMkLst>
-            <pc:docMk/>
-            <pc:sldMk cId="3381973727" sldId="304"/>
-            <ac:spMk id="3" creationId="{EE50BD1D-8638-4C47-A2EE-FA4BD58BB0BC}"/>
-          </ac:spMkLst>
-        </pc:spChg>
-        <pc:spChg chg="mod">
-          <ac:chgData name="Victor Valotto" userId="f8cd04a3a901a375" providerId="LiveId" clId="{9FE5FF6C-FF80-3A42-8EBA-5C9015AF763A}" dt="2019-04-24T21:56:27.537" v="211" actId="1076"/>
-          <ac:spMkLst>
-            <pc:docMk/>
-            <pc:sldMk cId="3381973727" sldId="304"/>
-            <ac:spMk id="15362" creationId="{BF1866F1-7FD8-4D4A-8DC4-18A0F31374FF}"/>
-          </ac:spMkLst>
-        </pc:spChg>
-        <pc:spChg chg="del mod">
-          <ac:chgData name="Victor Valotto" userId="f8cd04a3a901a375" providerId="LiveId" clId="{9FE5FF6C-FF80-3A42-8EBA-5C9015AF763A}" dt="2019-04-24T21:56:46.504" v="213" actId="478"/>
-          <ac:spMkLst>
-            <pc:docMk/>
-            <pc:sldMk cId="3381973727" sldId="304"/>
-            <ac:spMk id="15364" creationId="{DA6E7EDB-186D-0944-8965-FB93B54E7E9C}"/>
-          </ac:spMkLst>
-        </pc:spChg>
-        <pc:picChg chg="mod">
-          <ac:chgData name="Victor Valotto" userId="f8cd04a3a901a375" providerId="LiveId" clId="{9FE5FF6C-FF80-3A42-8EBA-5C9015AF763A}" dt="2019-04-24T21:57:00.309" v="220" actId="1076"/>
-          <ac:picMkLst>
-            <pc:docMk/>
-            <pc:sldMk cId="3381973727" sldId="304"/>
-            <ac:picMk id="15367" creationId="{998E8771-1837-F04D-8DE3-2866787AD433}"/>
-          </ac:picMkLst>
-        </pc:picChg>
-      </pc:sldChg>
-      <pc:sldChg chg="add">
-        <pc:chgData name="Victor Valotto" userId="f8cd04a3a901a375" providerId="LiveId" clId="{9FE5FF6C-FF80-3A42-8EBA-5C9015AF763A}" dt="2019-04-24T21:55:14.455" v="195"/>
-        <pc:sldMkLst>
-          <pc:docMk/>
-          <pc:sldMk cId="2699076964" sldId="305"/>
-        </pc:sldMkLst>
-      </pc:sldChg>
-      <pc:sldChg chg="modSp add">
-        <pc:chgData name="Victor Valotto" userId="f8cd04a3a901a375" providerId="LiveId" clId="{9FE5FF6C-FF80-3A42-8EBA-5C9015AF763A}" dt="2019-04-24T21:57:30.156" v="227" actId="1076"/>
-        <pc:sldMkLst>
-          <pc:docMk/>
-          <pc:sldMk cId="613512928" sldId="306"/>
-        </pc:sldMkLst>
-        <pc:spChg chg="mod">
-          <ac:chgData name="Victor Valotto" userId="f8cd04a3a901a375" providerId="LiveId" clId="{9FE5FF6C-FF80-3A42-8EBA-5C9015AF763A}" dt="2019-04-24T21:57:28.535" v="226" actId="1076"/>
-          <ac:spMkLst>
-            <pc:docMk/>
-            <pc:sldMk cId="613512928" sldId="306"/>
-            <ac:spMk id="17410" creationId="{54775A49-992F-7649-9E1E-DF2BDA972E81}"/>
-          </ac:spMkLst>
-        </pc:spChg>
-        <pc:picChg chg="mod">
-          <ac:chgData name="Victor Valotto" userId="f8cd04a3a901a375" providerId="LiveId" clId="{9FE5FF6C-FF80-3A42-8EBA-5C9015AF763A}" dt="2019-04-24T21:57:30.156" v="227" actId="1076"/>
-          <ac:picMkLst>
-            <pc:docMk/>
-            <pc:sldMk cId="613512928" sldId="306"/>
-            <ac:picMk id="6" creationId="{58A3562C-B373-9840-9B32-73054CFB2A5D}"/>
-          </ac:picMkLst>
-        </pc:picChg>
-      </pc:sldChg>
-      <pc:sldChg chg="modSp add">
-        <pc:chgData name="Victor Valotto" userId="f8cd04a3a901a375" providerId="LiveId" clId="{9FE5FF6C-FF80-3A42-8EBA-5C9015AF763A}" dt="2019-04-24T21:57:54.974" v="231" actId="1076"/>
-        <pc:sldMkLst>
-          <pc:docMk/>
-          <pc:sldMk cId="3448426282" sldId="307"/>
-        </pc:sldMkLst>
-        <pc:spChg chg="mod">
-          <ac:chgData name="Victor Valotto" userId="f8cd04a3a901a375" providerId="LiveId" clId="{9FE5FF6C-FF80-3A42-8EBA-5C9015AF763A}" dt="2019-04-24T21:57:40.443" v="229" actId="1076"/>
-          <ac:spMkLst>
-            <pc:docMk/>
-            <pc:sldMk cId="3448426282" sldId="307"/>
-            <ac:spMk id="18434" creationId="{148440CF-C8DA-1E43-8E6F-5C674B737DE8}"/>
-          </ac:spMkLst>
-        </pc:spChg>
-        <pc:spChg chg="mod">
-          <ac:chgData name="Victor Valotto" userId="f8cd04a3a901a375" providerId="LiveId" clId="{9FE5FF6C-FF80-3A42-8EBA-5C9015AF763A}" dt="2019-04-24T21:57:54.974" v="231" actId="1076"/>
-          <ac:spMkLst>
-            <pc:docMk/>
-            <pc:sldMk cId="3448426282" sldId="307"/>
-            <ac:spMk id="18438" creationId="{F1E815E9-B13C-E24C-B899-8467159FD830}"/>
-          </ac:spMkLst>
-        </pc:spChg>
-        <pc:spChg chg="mod">
-          <ac:chgData name="Victor Valotto" userId="f8cd04a3a901a375" providerId="LiveId" clId="{9FE5FF6C-FF80-3A42-8EBA-5C9015AF763A}" dt="2019-04-24T21:57:54.974" v="231" actId="1076"/>
-          <ac:spMkLst>
-            <pc:docMk/>
-            <pc:sldMk cId="3448426282" sldId="307"/>
-            <ac:spMk id="18439" creationId="{8FECE9D0-1B17-4243-B624-88BBF700E28A}"/>
-          </ac:spMkLst>
-        </pc:spChg>
-        <pc:spChg chg="mod">
-          <ac:chgData name="Victor Valotto" userId="f8cd04a3a901a375" providerId="LiveId" clId="{9FE5FF6C-FF80-3A42-8EBA-5C9015AF763A}" dt="2019-04-24T21:57:54.974" v="231" actId="1076"/>
-          <ac:spMkLst>
-            <pc:docMk/>
-            <pc:sldMk cId="3448426282" sldId="307"/>
-            <ac:spMk id="18440" creationId="{218B945D-3B4C-AC44-8ECD-B433FC5774ED}"/>
-          </ac:spMkLst>
-        </pc:spChg>
-        <pc:spChg chg="mod">
-          <ac:chgData name="Victor Valotto" userId="f8cd04a3a901a375" providerId="LiveId" clId="{9FE5FF6C-FF80-3A42-8EBA-5C9015AF763A}" dt="2019-04-24T21:57:54.974" v="231" actId="1076"/>
-          <ac:spMkLst>
-            <pc:docMk/>
-            <pc:sldMk cId="3448426282" sldId="307"/>
-            <ac:spMk id="18441" creationId="{8D8F9BDB-AC45-4243-947B-D43CFFBEA078}"/>
-          </ac:spMkLst>
-        </pc:spChg>
-        <pc:picChg chg="mod">
-          <ac:chgData name="Victor Valotto" userId="f8cd04a3a901a375" providerId="LiveId" clId="{9FE5FF6C-FF80-3A42-8EBA-5C9015AF763A}" dt="2019-04-24T21:57:54.974" v="231" actId="1076"/>
-          <ac:picMkLst>
-            <pc:docMk/>
-            <pc:sldMk cId="3448426282" sldId="307"/>
-            <ac:picMk id="18437" creationId="{929D21AC-04CF-CA4A-ADBE-E58F736A0BF4}"/>
-          </ac:picMkLst>
-        </pc:picChg>
-      </pc:sldChg>
-      <pc:sldChg chg="modSp add">
-        <pc:chgData name="Victor Valotto" userId="f8cd04a3a901a375" providerId="LiveId" clId="{9FE5FF6C-FF80-3A42-8EBA-5C9015AF763A}" dt="2019-04-24T21:58:07.079" v="235" actId="1076"/>
-        <pc:sldMkLst>
-          <pc:docMk/>
-          <pc:sldMk cId="2201219098" sldId="308"/>
-        </pc:sldMkLst>
-        <pc:spChg chg="mod">
-          <ac:chgData name="Victor Valotto" userId="f8cd04a3a901a375" providerId="LiveId" clId="{9FE5FF6C-FF80-3A42-8EBA-5C9015AF763A}" dt="2019-04-24T21:58:05.008" v="234" actId="1076"/>
-          <ac:spMkLst>
-            <pc:docMk/>
-            <pc:sldMk cId="2201219098" sldId="308"/>
-            <ac:spMk id="19458" creationId="{C3FCDE88-8DA1-4940-95B1-AA97A20B78DD}"/>
-          </ac:spMkLst>
-        </pc:spChg>
-        <pc:picChg chg="mod">
-          <ac:chgData name="Victor Valotto" userId="f8cd04a3a901a375" providerId="LiveId" clId="{9FE5FF6C-FF80-3A42-8EBA-5C9015AF763A}" dt="2019-04-24T21:58:07.079" v="235" actId="1076"/>
-          <ac:picMkLst>
-            <pc:docMk/>
-            <pc:sldMk cId="2201219098" sldId="308"/>
-            <ac:picMk id="115716" creationId="{B4115E9A-A3C7-EE48-9352-0EE757736820}"/>
-          </ac:picMkLst>
-        </pc:picChg>
-      </pc:sldChg>
-      <pc:sldChg chg="modSp add">
-        <pc:chgData name="Victor Valotto" userId="f8cd04a3a901a375" providerId="LiveId" clId="{9FE5FF6C-FF80-3A42-8EBA-5C9015AF763A}" dt="2019-04-24T21:58:42.426" v="239" actId="14100"/>
-        <pc:sldMkLst>
-          <pc:docMk/>
-          <pc:sldMk cId="2304418303" sldId="309"/>
-        </pc:sldMkLst>
-        <pc:spChg chg="mod">
-          <ac:chgData name="Victor Valotto" userId="f8cd04a3a901a375" providerId="LiveId" clId="{9FE5FF6C-FF80-3A42-8EBA-5C9015AF763A}" dt="2019-04-24T21:58:36.409" v="238" actId="1076"/>
-          <ac:spMkLst>
-            <pc:docMk/>
-            <pc:sldMk cId="2304418303" sldId="309"/>
-            <ac:spMk id="6" creationId="{79A150E8-7ADF-1949-B600-FBD32F8E5761}"/>
-          </ac:spMkLst>
-        </pc:spChg>
-        <pc:spChg chg="mod">
-          <ac:chgData name="Victor Valotto" userId="f8cd04a3a901a375" providerId="LiveId" clId="{9FE5FF6C-FF80-3A42-8EBA-5C9015AF763A}" dt="2019-04-24T21:58:36.409" v="238" actId="1076"/>
-          <ac:spMkLst>
-            <pc:docMk/>
-            <pc:sldMk cId="2304418303" sldId="309"/>
-            <ac:spMk id="7" creationId="{7E6A54E5-04C6-9F48-9552-E6ACD9ABCCD0}"/>
-          </ac:spMkLst>
-        </pc:spChg>
-        <pc:spChg chg="mod">
-          <ac:chgData name="Victor Valotto" userId="f8cd04a3a901a375" providerId="LiveId" clId="{9FE5FF6C-FF80-3A42-8EBA-5C9015AF763A}" dt="2019-04-24T21:58:36.409" v="238" actId="1076"/>
-          <ac:spMkLst>
-            <pc:docMk/>
-            <pc:sldMk cId="2304418303" sldId="309"/>
-            <ac:spMk id="8" creationId="{E70E86F6-CC8F-2D40-995C-BCB65C9C19B9}"/>
-          </ac:spMkLst>
-        </pc:spChg>
-        <pc:spChg chg="mod">
-          <ac:chgData name="Victor Valotto" userId="f8cd04a3a901a375" providerId="LiveId" clId="{9FE5FF6C-FF80-3A42-8EBA-5C9015AF763A}" dt="2019-04-24T21:58:36.409" v="238" actId="1076"/>
-          <ac:spMkLst>
-            <pc:docMk/>
-            <pc:sldMk cId="2304418303" sldId="309"/>
-            <ac:spMk id="9" creationId="{3C5106EE-F740-F546-A859-96D455E0E719}"/>
-          </ac:spMkLst>
-        </pc:spChg>
-        <pc:spChg chg="mod">
-          <ac:chgData name="Victor Valotto" userId="f8cd04a3a901a375" providerId="LiveId" clId="{9FE5FF6C-FF80-3A42-8EBA-5C9015AF763A}" dt="2019-04-24T21:58:36.409" v="238" actId="1076"/>
-          <ac:spMkLst>
-            <pc:docMk/>
-            <pc:sldMk cId="2304418303" sldId="309"/>
-            <ac:spMk id="10" creationId="{679ECB26-2900-F446-8A4B-3D915091388E}"/>
-          </ac:spMkLst>
-        </pc:spChg>
-        <pc:spChg chg="mod">
-          <ac:chgData name="Victor Valotto" userId="f8cd04a3a901a375" providerId="LiveId" clId="{9FE5FF6C-FF80-3A42-8EBA-5C9015AF763A}" dt="2019-04-24T21:58:36.409" v="238" actId="1076"/>
-          <ac:spMkLst>
-            <pc:docMk/>
-            <pc:sldMk cId="2304418303" sldId="309"/>
-            <ac:spMk id="11" creationId="{5EF938E1-BA8C-D140-B758-CD02BA10046C}"/>
-          </ac:spMkLst>
-        </pc:spChg>
-        <pc:spChg chg="mod">
-          <ac:chgData name="Victor Valotto" userId="f8cd04a3a901a375" providerId="LiveId" clId="{9FE5FF6C-FF80-3A42-8EBA-5C9015AF763A}" dt="2019-04-24T21:58:36.409" v="238" actId="1076"/>
-          <ac:spMkLst>
-            <pc:docMk/>
-            <pc:sldMk cId="2304418303" sldId="309"/>
-            <ac:spMk id="12" creationId="{F7C37E5F-38B4-8E4B-AA10-ACBDBDD9E439}"/>
-          </ac:spMkLst>
-        </pc:spChg>
-        <pc:spChg chg="mod">
-          <ac:chgData name="Victor Valotto" userId="f8cd04a3a901a375" providerId="LiveId" clId="{9FE5FF6C-FF80-3A42-8EBA-5C9015AF763A}" dt="2019-04-24T21:58:36.409" v="238" actId="1076"/>
-          <ac:spMkLst>
-            <pc:docMk/>
-            <pc:sldMk cId="2304418303" sldId="309"/>
-            <ac:spMk id="27" creationId="{E750E872-1EBD-A943-8037-FF2DF3A62A9F}"/>
-          </ac:spMkLst>
-        </pc:spChg>
-        <pc:spChg chg="mod">
-          <ac:chgData name="Victor Valotto" userId="f8cd04a3a901a375" providerId="LiveId" clId="{9FE5FF6C-FF80-3A42-8EBA-5C9015AF763A}" dt="2019-04-24T21:58:36.409" v="238" actId="1076"/>
-          <ac:spMkLst>
-            <pc:docMk/>
-            <pc:sldMk cId="2304418303" sldId="309"/>
-            <ac:spMk id="28" creationId="{5B6D231C-111F-D147-91CA-558C24394617}"/>
-          </ac:spMkLst>
-        </pc:spChg>
-        <pc:spChg chg="mod">
-          <ac:chgData name="Victor Valotto" userId="f8cd04a3a901a375" providerId="LiveId" clId="{9FE5FF6C-FF80-3A42-8EBA-5C9015AF763A}" dt="2019-04-24T21:58:36.409" v="238" actId="1076"/>
-          <ac:spMkLst>
-            <pc:docMk/>
-            <pc:sldMk cId="2304418303" sldId="309"/>
-            <ac:spMk id="32" creationId="{BA3AF8F5-AEFC-B747-832D-7C92D6E9A3FB}"/>
-          </ac:spMkLst>
-        </pc:spChg>
-        <pc:spChg chg="mod">
-          <ac:chgData name="Victor Valotto" userId="f8cd04a3a901a375" providerId="LiveId" clId="{9FE5FF6C-FF80-3A42-8EBA-5C9015AF763A}" dt="2019-04-24T21:58:42.426" v="239" actId="14100"/>
-          <ac:spMkLst>
-            <pc:docMk/>
-            <pc:sldMk cId="2304418303" sldId="309"/>
-            <ac:spMk id="20482" creationId="{B32A091E-02EF-CA4A-87ED-ABF6EB3F49F9}"/>
-          </ac:spMkLst>
-        </pc:spChg>
-        <pc:spChg chg="mod">
-          <ac:chgData name="Victor Valotto" userId="f8cd04a3a901a375" providerId="LiveId" clId="{9FE5FF6C-FF80-3A42-8EBA-5C9015AF763A}" dt="2019-04-24T21:58:36.409" v="238" actId="1076"/>
-          <ac:spMkLst>
-            <pc:docMk/>
-            <pc:sldMk cId="2304418303" sldId="309"/>
-            <ac:spMk id="20506" creationId="{4C595572-49A6-8D4F-974B-F080D8AB5EA4}"/>
-          </ac:spMkLst>
-        </pc:spChg>
-        <pc:spChg chg="mod">
-          <ac:chgData name="Victor Valotto" userId="f8cd04a3a901a375" providerId="LiveId" clId="{9FE5FF6C-FF80-3A42-8EBA-5C9015AF763A}" dt="2019-04-24T21:58:36.409" v="238" actId="1076"/>
-          <ac:spMkLst>
-            <pc:docMk/>
-            <pc:sldMk cId="2304418303" sldId="309"/>
-            <ac:spMk id="20507" creationId="{8DF6190E-84DC-AF48-8756-8450661A4D30}"/>
-          </ac:spMkLst>
-        </pc:spChg>
-        <pc:spChg chg="mod">
-          <ac:chgData name="Victor Valotto" userId="f8cd04a3a901a375" providerId="LiveId" clId="{9FE5FF6C-FF80-3A42-8EBA-5C9015AF763A}" dt="2019-04-24T21:58:36.409" v="238" actId="1076"/>
-          <ac:spMkLst>
-            <pc:docMk/>
-            <pc:sldMk cId="2304418303" sldId="309"/>
-            <ac:spMk id="20508" creationId="{42B02BC2-D8E8-3745-9CB1-9EB422763407}"/>
-          </ac:spMkLst>
-        </pc:spChg>
-        <pc:spChg chg="mod">
-          <ac:chgData name="Victor Valotto" userId="f8cd04a3a901a375" providerId="LiveId" clId="{9FE5FF6C-FF80-3A42-8EBA-5C9015AF763A}" dt="2019-04-24T21:58:36.409" v="238" actId="1076"/>
-          <ac:spMkLst>
-            <pc:docMk/>
-            <pc:sldMk cId="2304418303" sldId="309"/>
-            <ac:spMk id="20509" creationId="{CA92135B-B41B-3C4B-846E-794F818DEA5E}"/>
-          </ac:spMkLst>
-        </pc:spChg>
-        <pc:spChg chg="mod">
-          <ac:chgData name="Victor Valotto" userId="f8cd04a3a901a375" providerId="LiveId" clId="{9FE5FF6C-FF80-3A42-8EBA-5C9015AF763A}" dt="2019-04-24T21:58:36.409" v="238" actId="1076"/>
-          <ac:spMkLst>
-            <pc:docMk/>
-            <pc:sldMk cId="2304418303" sldId="309"/>
-            <ac:spMk id="20510" creationId="{9BCFDC2F-BFAD-1141-8ED5-163F78B72860}"/>
-          </ac:spMkLst>
-        </pc:spChg>
-        <pc:spChg chg="mod">
-          <ac:chgData name="Victor Valotto" userId="f8cd04a3a901a375" providerId="LiveId" clId="{9FE5FF6C-FF80-3A42-8EBA-5C9015AF763A}" dt="2019-04-24T21:58:36.409" v="238" actId="1076"/>
-          <ac:spMkLst>
-            <pc:docMk/>
-            <pc:sldMk cId="2304418303" sldId="309"/>
-            <ac:spMk id="20511" creationId="{AD66C5EB-C553-654F-9E1B-061EB8D63587}"/>
-          </ac:spMkLst>
-        </pc:spChg>
-        <pc:spChg chg="mod">
-          <ac:chgData name="Victor Valotto" userId="f8cd04a3a901a375" providerId="LiveId" clId="{9FE5FF6C-FF80-3A42-8EBA-5C9015AF763A}" dt="2019-04-24T21:58:36.409" v="238" actId="1076"/>
-          <ac:spMkLst>
-            <pc:docMk/>
-            <pc:sldMk cId="2304418303" sldId="309"/>
-            <ac:spMk id="20512" creationId="{A144C1A0-C2A7-594C-9FA4-708B8EF94CD0}"/>
-          </ac:spMkLst>
-        </pc:spChg>
-        <pc:spChg chg="mod">
-          <ac:chgData name="Victor Valotto" userId="f8cd04a3a901a375" providerId="LiveId" clId="{9FE5FF6C-FF80-3A42-8EBA-5C9015AF763A}" dt="2019-04-24T21:58:36.409" v="238" actId="1076"/>
-          <ac:spMkLst>
-            <pc:docMk/>
-            <pc:sldMk cId="2304418303" sldId="309"/>
-            <ac:spMk id="20513" creationId="{D4EA37CC-0CFC-E34C-AC8C-12745BE9D655}"/>
-          </ac:spMkLst>
-        </pc:spChg>
-        <pc:spChg chg="mod">
-          <ac:chgData name="Victor Valotto" userId="f8cd04a3a901a375" providerId="LiveId" clId="{9FE5FF6C-FF80-3A42-8EBA-5C9015AF763A}" dt="2019-04-24T21:58:36.409" v="238" actId="1076"/>
-          <ac:spMkLst>
-            <pc:docMk/>
-            <pc:sldMk cId="2304418303" sldId="309"/>
-            <ac:spMk id="20514" creationId="{CC591386-9988-4E46-8164-127AC8A58DBA}"/>
-          </ac:spMkLst>
-        </pc:spChg>
-        <pc:spChg chg="mod">
-          <ac:chgData name="Victor Valotto" userId="f8cd04a3a901a375" providerId="LiveId" clId="{9FE5FF6C-FF80-3A42-8EBA-5C9015AF763A}" dt="2019-04-24T21:58:36.409" v="238" actId="1076"/>
-          <ac:spMkLst>
-            <pc:docMk/>
-            <pc:sldMk cId="2304418303" sldId="309"/>
-            <ac:spMk id="20515" creationId="{88C3F56C-76C2-314D-A9AB-ACCB6C037223}"/>
-          </ac:spMkLst>
-        </pc:spChg>
-        <pc:spChg chg="mod">
-          <ac:chgData name="Victor Valotto" userId="f8cd04a3a901a375" providerId="LiveId" clId="{9FE5FF6C-FF80-3A42-8EBA-5C9015AF763A}" dt="2019-04-24T21:58:36.409" v="238" actId="1076"/>
-          <ac:spMkLst>
-            <pc:docMk/>
-            <pc:sldMk cId="2304418303" sldId="309"/>
-            <ac:spMk id="20516" creationId="{49B9EC29-0BAA-794F-941A-65A63E130E99}"/>
-          </ac:spMkLst>
-        </pc:spChg>
-        <pc:spChg chg="mod">
-          <ac:chgData name="Victor Valotto" userId="f8cd04a3a901a375" providerId="LiveId" clId="{9FE5FF6C-FF80-3A42-8EBA-5C9015AF763A}" dt="2019-04-24T21:58:36.409" v="238" actId="1076"/>
-          <ac:spMkLst>
-            <pc:docMk/>
-            <pc:sldMk cId="2304418303" sldId="309"/>
-            <ac:spMk id="20517" creationId="{66C04E38-735A-784B-8162-35D7D0ED3106}"/>
-          </ac:spMkLst>
-        </pc:spChg>
-        <pc:spChg chg="mod">
-          <ac:chgData name="Victor Valotto" userId="f8cd04a3a901a375" providerId="LiveId" clId="{9FE5FF6C-FF80-3A42-8EBA-5C9015AF763A}" dt="2019-04-24T21:58:36.409" v="238" actId="1076"/>
-          <ac:spMkLst>
-            <pc:docMk/>
-            <pc:sldMk cId="2304418303" sldId="309"/>
-            <ac:spMk id="20518" creationId="{617DC2D7-360D-9045-9183-F983F5A40B22}"/>
-          </ac:spMkLst>
-        </pc:spChg>
-        <pc:spChg chg="mod">
-          <ac:chgData name="Victor Valotto" userId="f8cd04a3a901a375" providerId="LiveId" clId="{9FE5FF6C-FF80-3A42-8EBA-5C9015AF763A}" dt="2019-04-24T21:58:36.409" v="238" actId="1076"/>
-          <ac:spMkLst>
-            <pc:docMk/>
-            <pc:sldMk cId="2304418303" sldId="309"/>
-            <ac:spMk id="20519" creationId="{568FB614-2284-3248-81FF-F172FF31075D}"/>
-          </ac:spMkLst>
-        </pc:spChg>
-        <pc:spChg chg="mod">
-          <ac:chgData name="Victor Valotto" userId="f8cd04a3a901a375" providerId="LiveId" clId="{9FE5FF6C-FF80-3A42-8EBA-5C9015AF763A}" dt="2019-04-24T21:58:36.409" v="238" actId="1076"/>
-          <ac:spMkLst>
-            <pc:docMk/>
-            <pc:sldMk cId="2304418303" sldId="309"/>
-            <ac:spMk id="20522" creationId="{2224C7F5-1F39-1748-9CFF-7BE81C719331}"/>
-          </ac:spMkLst>
-        </pc:spChg>
-        <pc:cxnChg chg="mod">
-          <ac:chgData name="Victor Valotto" userId="f8cd04a3a901a375" providerId="LiveId" clId="{9FE5FF6C-FF80-3A42-8EBA-5C9015AF763A}" dt="2019-04-24T21:58:36.409" v="238" actId="1076"/>
-          <ac:cxnSpMkLst>
-            <pc:docMk/>
-            <pc:sldMk cId="2304418303" sldId="309"/>
-            <ac:cxnSpMk id="20523" creationId="{12A7AABB-CA09-A445-B11F-59959E5124E4}"/>
-          </ac:cxnSpMkLst>
-        </pc:cxnChg>
-        <pc:cxnChg chg="mod">
-          <ac:chgData name="Victor Valotto" userId="f8cd04a3a901a375" providerId="LiveId" clId="{9FE5FF6C-FF80-3A42-8EBA-5C9015AF763A}" dt="2019-04-24T21:58:36.409" v="238" actId="1076"/>
-          <ac:cxnSpMkLst>
-            <pc:docMk/>
-            <pc:sldMk cId="2304418303" sldId="309"/>
-            <ac:cxnSpMk id="20524" creationId="{2BF3F350-1018-4F4E-B54E-6FD03EE12CE1}"/>
-          </ac:cxnSpMkLst>
-        </pc:cxnChg>
-      </pc:sldChg>
-      <pc:sldChg chg="modSp add del">
-        <pc:chgData name="Victor Valotto" userId="f8cd04a3a901a375" providerId="LiveId" clId="{9FE5FF6C-FF80-3A42-8EBA-5C9015AF763A}" dt="2019-04-24T21:59:03.642" v="242" actId="2696"/>
-        <pc:sldMkLst>
-          <pc:docMk/>
-          <pc:sldMk cId="1256566616" sldId="311"/>
-        </pc:sldMkLst>
-        <pc:spChg chg="mod">
-          <ac:chgData name="Victor Valotto" userId="f8cd04a3a901a375" providerId="LiveId" clId="{9FE5FF6C-FF80-3A42-8EBA-5C9015AF763A}" dt="2019-04-24T21:58:54.272" v="241" actId="1076"/>
-          <ac:spMkLst>
-            <pc:docMk/>
-            <pc:sldMk cId="1256566616" sldId="311"/>
-            <ac:spMk id="3" creationId="{BEAEB52D-64E8-E74B-9C77-72E26313F8B9}"/>
-          </ac:spMkLst>
-        </pc:spChg>
-        <pc:graphicFrameChg chg="mod">
-          <ac:chgData name="Victor Valotto" userId="f8cd04a3a901a375" providerId="LiveId" clId="{9FE5FF6C-FF80-3A42-8EBA-5C9015AF763A}" dt="2019-04-24T21:58:49.783" v="240" actId="1076"/>
-          <ac:graphicFrameMkLst>
-            <pc:docMk/>
-            <pc:sldMk cId="1256566616" sldId="311"/>
-            <ac:graphicFrameMk id="7" creationId="{05732B18-B583-004F-9A52-EE56507E794C}"/>
-          </ac:graphicFrameMkLst>
-        </pc:graphicFrameChg>
-      </pc:sldChg>
-      <pc:sldChg chg="modSp add">
-        <pc:chgData name="Victor Valotto" userId="f8cd04a3a901a375" providerId="LiveId" clId="{9FE5FF6C-FF80-3A42-8EBA-5C9015AF763A}" dt="2019-04-24T21:25:46.531" v="119" actId="20577"/>
-        <pc:sldMkLst>
-          <pc:docMk/>
-          <pc:sldMk cId="3555910041" sldId="312"/>
-        </pc:sldMkLst>
-        <pc:spChg chg="mod">
-          <ac:chgData name="Victor Valotto" userId="f8cd04a3a901a375" providerId="LiveId" clId="{9FE5FF6C-FF80-3A42-8EBA-5C9015AF763A}" dt="2019-04-24T21:25:46.531" v="119" actId="20577"/>
-          <ac:spMkLst>
-            <pc:docMk/>
-            <pc:sldMk cId="3555910041" sldId="312"/>
-            <ac:spMk id="11267" creationId="{9FE2609B-63B9-3B4A-9FCE-621A655FCF70}"/>
-          </ac:spMkLst>
-        </pc:spChg>
-        <pc:spChg chg="mod">
-          <ac:chgData name="Victor Valotto" userId="f8cd04a3a901a375" providerId="LiveId" clId="{9FE5FF6C-FF80-3A42-8EBA-5C9015AF763A}" dt="2019-04-24T21:25:22.917" v="117" actId="14100"/>
-          <ac:spMkLst>
-            <pc:docMk/>
-            <pc:sldMk cId="3555910041" sldId="312"/>
-            <ac:spMk id="11269" creationId="{44CEE76C-B07F-C542-B792-68297EA491C5}"/>
-          </ac:spMkLst>
-        </pc:spChg>
-      </pc:sldChg>
-      <pc:sldChg chg="modSp add">
-        <pc:chgData name="Victor Valotto" userId="f8cd04a3a901a375" providerId="LiveId" clId="{9FE5FF6C-FF80-3A42-8EBA-5C9015AF763A}" dt="2019-04-24T21:26:09.965" v="126" actId="1076"/>
-        <pc:sldMkLst>
-          <pc:docMk/>
-          <pc:sldMk cId="3656202556" sldId="313"/>
-        </pc:sldMkLst>
-        <pc:spChg chg="mod">
-          <ac:chgData name="Victor Valotto" userId="f8cd04a3a901a375" providerId="LiveId" clId="{9FE5FF6C-FF80-3A42-8EBA-5C9015AF763A}" dt="2019-04-24T21:25:55.587" v="121" actId="1076"/>
-          <ac:spMkLst>
-            <pc:docMk/>
-            <pc:sldMk cId="3656202556" sldId="313"/>
-            <ac:spMk id="1028" creationId="{8C43FCB1-7B75-E540-A48F-2A875459595E}"/>
-          </ac:spMkLst>
-        </pc:spChg>
-        <pc:spChg chg="mod">
-          <ac:chgData name="Victor Valotto" userId="f8cd04a3a901a375" providerId="LiveId" clId="{9FE5FF6C-FF80-3A42-8EBA-5C9015AF763A}" dt="2019-04-24T21:25:59.828" v="122" actId="1076"/>
-          <ac:spMkLst>
-            <pc:docMk/>
-            <pc:sldMk cId="3656202556" sldId="313"/>
-            <ac:spMk id="1029" creationId="{0E7F16DC-5011-924B-80E7-D04287E89EA5}"/>
-          </ac:spMkLst>
-        </pc:spChg>
-        <pc:spChg chg="mod">
-          <ac:chgData name="Victor Valotto" userId="f8cd04a3a901a375" providerId="LiveId" clId="{9FE5FF6C-FF80-3A42-8EBA-5C9015AF763A}" dt="2019-04-24T21:26:08.176" v="125" actId="1076"/>
-          <ac:spMkLst>
-            <pc:docMk/>
-            <pc:sldMk cId="3656202556" sldId="313"/>
-            <ac:spMk id="1030" creationId="{F131D92F-F90F-8D49-A9AD-0EC238C73BFF}"/>
-          </ac:spMkLst>
-        </pc:spChg>
-        <pc:graphicFrameChg chg="mod">
-          <ac:chgData name="Victor Valotto" userId="f8cd04a3a901a375" providerId="LiveId" clId="{9FE5FF6C-FF80-3A42-8EBA-5C9015AF763A}" dt="2019-04-24T21:26:09.965" v="126" actId="1076"/>
-          <ac:graphicFrameMkLst>
-            <pc:docMk/>
-            <pc:sldMk cId="3656202556" sldId="313"/>
-            <ac:graphicFrameMk id="1026" creationId="{ADFEFC10-BF76-5A4C-8C47-723083337A55}"/>
-          </ac:graphicFrameMkLst>
-        </pc:graphicFrameChg>
-      </pc:sldChg>
-      <pc:sldChg chg="modSp add">
-        <pc:chgData name="Victor Valotto" userId="f8cd04a3a901a375" providerId="LiveId" clId="{9FE5FF6C-FF80-3A42-8EBA-5C9015AF763A}" dt="2019-04-24T21:26:47.856" v="133" actId="1076"/>
-        <pc:sldMkLst>
-          <pc:docMk/>
-          <pc:sldMk cId="2680368346" sldId="314"/>
-        </pc:sldMkLst>
-        <pc:spChg chg="mod">
-          <ac:chgData name="Victor Valotto" userId="f8cd04a3a901a375" providerId="LiveId" clId="{9FE5FF6C-FF80-3A42-8EBA-5C9015AF763A}" dt="2019-04-24T21:26:29.540" v="128" actId="1076"/>
-          <ac:spMkLst>
-            <pc:docMk/>
-            <pc:sldMk cId="2680368346" sldId="314"/>
-            <ac:spMk id="2054" creationId="{108D513C-7250-EB4C-8215-85E8EC4BACB7}"/>
-          </ac:spMkLst>
-        </pc:spChg>
-        <pc:spChg chg="mod">
-          <ac:chgData name="Victor Valotto" userId="f8cd04a3a901a375" providerId="LiveId" clId="{9FE5FF6C-FF80-3A42-8EBA-5C9015AF763A}" dt="2019-04-24T21:26:35.683" v="129" actId="1076"/>
-          <ac:spMkLst>
-            <pc:docMk/>
-            <pc:sldMk cId="2680368346" sldId="314"/>
-            <ac:spMk id="2055" creationId="{39C6CA91-621D-5146-AF5E-2CAC2A607DA2}"/>
-          </ac:spMkLst>
-        </pc:spChg>
-        <pc:spChg chg="mod">
-          <ac:chgData name="Victor Valotto" userId="f8cd04a3a901a375" providerId="LiveId" clId="{9FE5FF6C-FF80-3A42-8EBA-5C9015AF763A}" dt="2019-04-24T21:26:38.551" v="130" actId="1076"/>
-          <ac:spMkLst>
-            <pc:docMk/>
-            <pc:sldMk cId="2680368346" sldId="314"/>
-            <ac:spMk id="2056" creationId="{FD07F46A-767B-0646-9DBA-AFC6C72BE7B7}"/>
-          </ac:spMkLst>
-        </pc:spChg>
-        <pc:graphicFrameChg chg="mod">
-          <ac:chgData name="Victor Valotto" userId="f8cd04a3a901a375" providerId="LiveId" clId="{9FE5FF6C-FF80-3A42-8EBA-5C9015AF763A}" dt="2019-04-24T21:26:40.802" v="131" actId="1076"/>
-          <ac:graphicFrameMkLst>
-            <pc:docMk/>
-            <pc:sldMk cId="2680368346" sldId="314"/>
-            <ac:graphicFrameMk id="2050" creationId="{0BB22867-9915-8842-95B2-63A00CD678B2}"/>
-          </ac:graphicFrameMkLst>
-        </pc:graphicFrameChg>
-        <pc:graphicFrameChg chg="mod">
-          <ac:chgData name="Victor Valotto" userId="f8cd04a3a901a375" providerId="LiveId" clId="{9FE5FF6C-FF80-3A42-8EBA-5C9015AF763A}" dt="2019-04-24T21:26:43.806" v="132" actId="1076"/>
-          <ac:graphicFrameMkLst>
-            <pc:docMk/>
-            <pc:sldMk cId="2680368346" sldId="314"/>
-            <ac:graphicFrameMk id="2051" creationId="{E06AA996-2804-A741-9AF8-5F5932F185C9}"/>
-          </ac:graphicFrameMkLst>
-        </pc:graphicFrameChg>
-        <pc:graphicFrameChg chg="mod">
-          <ac:chgData name="Victor Valotto" userId="f8cd04a3a901a375" providerId="LiveId" clId="{9FE5FF6C-FF80-3A42-8EBA-5C9015AF763A}" dt="2019-04-24T21:26:47.856" v="133" actId="1076"/>
-          <ac:graphicFrameMkLst>
-            <pc:docMk/>
-            <pc:sldMk cId="2680368346" sldId="314"/>
-            <ac:graphicFrameMk id="2052" creationId="{69854F10-9675-E347-A877-5CA1E323A4FC}"/>
-          </ac:graphicFrameMkLst>
-        </pc:graphicFrameChg>
-      </pc:sldChg>
-      <pc:sldChg chg="modSp add">
-        <pc:chgData name="Victor Valotto" userId="f8cd04a3a901a375" providerId="LiveId" clId="{9FE5FF6C-FF80-3A42-8EBA-5C9015AF763A}" dt="2019-04-24T21:59:47.293" v="255" actId="1076"/>
-        <pc:sldMkLst>
-          <pc:docMk/>
-          <pc:sldMk cId="2490127546" sldId="315"/>
-        </pc:sldMkLst>
-        <pc:spChg chg="mod">
-          <ac:chgData name="Victor Valotto" userId="f8cd04a3a901a375" providerId="LiveId" clId="{9FE5FF6C-FF80-3A42-8EBA-5C9015AF763A}" dt="2019-04-24T21:59:47.293" v="255" actId="1076"/>
-          <ac:spMkLst>
-            <pc:docMk/>
-            <pc:sldMk cId="2490127546" sldId="315"/>
-            <ac:spMk id="25602" creationId="{8CA361A4-E8D0-A845-B23E-F034222F54A2}"/>
-          </ac:spMkLst>
-        </pc:spChg>
-        <pc:spChg chg="mod">
-          <ac:chgData name="Victor Valotto" userId="f8cd04a3a901a375" providerId="LiveId" clId="{9FE5FF6C-FF80-3A42-8EBA-5C9015AF763A}" dt="2019-04-24T21:59:39.588" v="252" actId="1076"/>
-          <ac:spMkLst>
-            <pc:docMk/>
-            <pc:sldMk cId="2490127546" sldId="315"/>
-            <ac:spMk id="25606" creationId="{9F180B0C-E7E8-CC48-82F3-E1C4E6DFDE6E}"/>
-          </ac:spMkLst>
-        </pc:spChg>
-        <pc:picChg chg="mod">
-          <ac:chgData name="Victor Valotto" userId="f8cd04a3a901a375" providerId="LiveId" clId="{9FE5FF6C-FF80-3A42-8EBA-5C9015AF763A}" dt="2019-04-24T21:59:39.588" v="252" actId="1076"/>
-          <ac:picMkLst>
-            <pc:docMk/>
-            <pc:sldMk cId="2490127546" sldId="315"/>
-            <ac:picMk id="25605" creationId="{EACD90F5-DD69-9244-987D-06A2A95B264B}"/>
-          </ac:picMkLst>
-        </pc:picChg>
-      </pc:sldChg>
-      <pc:sldChg chg="modSp add">
-        <pc:chgData name="Victor Valotto" userId="f8cd04a3a901a375" providerId="LiveId" clId="{9FE5FF6C-FF80-3A42-8EBA-5C9015AF763A}" dt="2019-04-24T21:28:08.946" v="151" actId="1076"/>
-        <pc:sldMkLst>
-          <pc:docMk/>
-          <pc:sldMk cId="3178586805" sldId="316"/>
-        </pc:sldMkLst>
-        <pc:spChg chg="mod">
-          <ac:chgData name="Victor Valotto" userId="f8cd04a3a901a375" providerId="LiveId" clId="{9FE5FF6C-FF80-3A42-8EBA-5C9015AF763A}" dt="2019-04-24T21:28:04.919" v="150" actId="20577"/>
-          <ac:spMkLst>
-            <pc:docMk/>
-            <pc:sldMk cId="3178586805" sldId="316"/>
-            <ac:spMk id="14339" creationId="{E79EC976-B14E-A841-B46B-DAEF86D1FC55}"/>
-          </ac:spMkLst>
-        </pc:spChg>
-        <pc:spChg chg="mod">
-          <ac:chgData name="Victor Valotto" userId="f8cd04a3a901a375" providerId="LiveId" clId="{9FE5FF6C-FF80-3A42-8EBA-5C9015AF763A}" dt="2019-04-24T21:27:55.142" v="146" actId="1076"/>
-          <ac:spMkLst>
-            <pc:docMk/>
-            <pc:sldMk cId="3178586805" sldId="316"/>
-            <ac:spMk id="14340" creationId="{AF177AC0-9689-F948-AAF3-3400236A111E}"/>
-          </ac:spMkLst>
-        </pc:spChg>
-        <pc:spChg chg="mod">
-          <ac:chgData name="Victor Valotto" userId="f8cd04a3a901a375" providerId="LiveId" clId="{9FE5FF6C-FF80-3A42-8EBA-5C9015AF763A}" dt="2019-04-24T21:28:08.946" v="151" actId="1076"/>
-          <ac:spMkLst>
-            <pc:docMk/>
-            <pc:sldMk cId="3178586805" sldId="316"/>
-            <ac:spMk id="14341" creationId="{73EDA113-7A49-BC4B-B9E1-5CD884B04306}"/>
-          </ac:spMkLst>
-        </pc:spChg>
-      </pc:sldChg>
-      <pc:sldChg chg="modSp add">
-        <pc:chgData name="Victor Valotto" userId="f8cd04a3a901a375" providerId="LiveId" clId="{9FE5FF6C-FF80-3A42-8EBA-5C9015AF763A}" dt="2019-04-24T21:27:36.849" v="144" actId="1076"/>
-        <pc:sldMkLst>
-          <pc:docMk/>
-          <pc:sldMk cId="2180059570" sldId="317"/>
-        </pc:sldMkLst>
-        <pc:spChg chg="mod">
-          <ac:chgData name="Victor Valotto" userId="f8cd04a3a901a375" providerId="LiveId" clId="{9FE5FF6C-FF80-3A42-8EBA-5C9015AF763A}" dt="2019-04-24T21:27:22.528" v="140" actId="14100"/>
-          <ac:spMkLst>
-            <pc:docMk/>
-            <pc:sldMk cId="2180059570" sldId="317"/>
-            <ac:spMk id="13315" creationId="{C2EDCB93-A9ED-5543-95ED-56685E762902}"/>
-          </ac:spMkLst>
-        </pc:spChg>
-        <pc:spChg chg="mod">
-          <ac:chgData name="Victor Valotto" userId="f8cd04a3a901a375" providerId="LiveId" clId="{9FE5FF6C-FF80-3A42-8EBA-5C9015AF763A}" dt="2019-04-24T21:27:07.859" v="137" actId="1076"/>
-          <ac:spMkLst>
-            <pc:docMk/>
-            <pc:sldMk cId="2180059570" sldId="317"/>
-            <ac:spMk id="13316" creationId="{00DEE62D-C4B4-4A46-96EF-14FD58322AEC}"/>
-          </ac:spMkLst>
-        </pc:spChg>
-        <pc:spChg chg="mod">
-          <ac:chgData name="Victor Valotto" userId="f8cd04a3a901a375" providerId="LiveId" clId="{9FE5FF6C-FF80-3A42-8EBA-5C9015AF763A}" dt="2019-04-24T21:27:36.849" v="144" actId="1076"/>
-          <ac:spMkLst>
-            <pc:docMk/>
-            <pc:sldMk cId="2180059570" sldId="317"/>
-            <ac:spMk id="13317" creationId="{63A0F5EC-13E6-9147-8980-06C1D4080204}"/>
-          </ac:spMkLst>
-        </pc:spChg>
-        <pc:spChg chg="mod">
-          <ac:chgData name="Victor Valotto" userId="f8cd04a3a901a375" providerId="LiveId" clId="{9FE5FF6C-FF80-3A42-8EBA-5C9015AF763A}" dt="2019-04-24T21:27:34.251" v="143" actId="1076"/>
-          <ac:spMkLst>
-            <pc:docMk/>
-            <pc:sldMk cId="2180059570" sldId="317"/>
-            <ac:spMk id="13318" creationId="{14A5BCAC-3CCA-D14B-9E35-55E4A7261F0F}"/>
-          </ac:spMkLst>
-        </pc:spChg>
-      </pc:sldChg>
-      <pc:sldChg chg="modSp add">
-        <pc:chgData name="Victor Valotto" userId="f8cd04a3a901a375" providerId="LiveId" clId="{9FE5FF6C-FF80-3A42-8EBA-5C9015AF763A}" dt="2019-04-24T21:26:57.451" v="135" actId="1076"/>
-        <pc:sldMkLst>
-          <pc:docMk/>
-          <pc:sldMk cId="2910819169" sldId="318"/>
-        </pc:sldMkLst>
-        <pc:spChg chg="mod">
-          <ac:chgData name="Victor Valotto" userId="f8cd04a3a901a375" providerId="LiveId" clId="{9FE5FF6C-FF80-3A42-8EBA-5C9015AF763A}" dt="2019-04-24T21:26:57.451" v="135" actId="1076"/>
-          <ac:spMkLst>
-            <pc:docMk/>
-            <pc:sldMk cId="2910819169" sldId="318"/>
-            <ac:spMk id="12292" creationId="{89684F39-A21F-D440-9617-2514BA74C605}"/>
-          </ac:spMkLst>
-        </pc:spChg>
-      </pc:sldChg>
-      <pc:sldChg chg="add">
-        <pc:chgData name="Victor Valotto" userId="f8cd04a3a901a375" providerId="LiveId" clId="{9FE5FF6C-FF80-3A42-8EBA-5C9015AF763A}" dt="2019-04-24T22:35:56.223" v="282"/>
-        <pc:sldMkLst>
-          <pc:docMk/>
-          <pc:sldMk cId="315515351" sldId="319"/>
-        </pc:sldMkLst>
-      </pc:sldChg>
-      <pc:sldChg chg="addSp delSp modSp add delAnim">
-        <pc:chgData name="Victor Valotto" userId="f8cd04a3a901a375" providerId="LiveId" clId="{9FE5FF6C-FF80-3A42-8EBA-5C9015AF763A}" dt="2019-04-24T22:02:53.496" v="272"/>
-        <pc:sldMkLst>
-          <pc:docMk/>
-          <pc:sldMk cId="3999338705" sldId="320"/>
-        </pc:sldMkLst>
-        <pc:spChg chg="add mod">
-          <ac:chgData name="Victor Valotto" userId="f8cd04a3a901a375" providerId="LiveId" clId="{9FE5FF6C-FF80-3A42-8EBA-5C9015AF763A}" dt="2019-04-24T22:02:53.496" v="272"/>
-          <ac:spMkLst>
-            <pc:docMk/>
-            <pc:sldMk cId="3999338705" sldId="320"/>
-            <ac:spMk id="4" creationId="{8D5B626B-71BA-794C-8DD8-4956892F35D3}"/>
-          </ac:spMkLst>
-        </pc:spChg>
-        <pc:spChg chg="del">
-          <ac:chgData name="Victor Valotto" userId="f8cd04a3a901a375" providerId="LiveId" clId="{9FE5FF6C-FF80-3A42-8EBA-5C9015AF763A}" dt="2019-04-24T22:02:01.002" v="264" actId="478"/>
-          <ac:spMkLst>
-            <pc:docMk/>
-            <pc:sldMk cId="3999338705" sldId="320"/>
-            <ac:spMk id="18" creationId="{222E3CCD-29A8-B44A-919A-1CBE0894C7C0}"/>
-          </ac:spMkLst>
-        </pc:spChg>
-        <pc:spChg chg="del">
-          <ac:chgData name="Victor Valotto" userId="f8cd04a3a901a375" providerId="LiveId" clId="{9FE5FF6C-FF80-3A42-8EBA-5C9015AF763A}" dt="2019-04-24T22:02:06.492" v="266" actId="478"/>
-          <ac:spMkLst>
-            <pc:docMk/>
-            <pc:sldMk cId="3999338705" sldId="320"/>
-            <ac:spMk id="31746" creationId="{610C1498-6155-1D4D-BFC2-6F0EF2F44185}"/>
-          </ac:spMkLst>
-        </pc:spChg>
-        <pc:spChg chg="del">
-          <ac:chgData name="Victor Valotto" userId="f8cd04a3a901a375" providerId="LiveId" clId="{9FE5FF6C-FF80-3A42-8EBA-5C9015AF763A}" dt="2019-04-24T22:02:01.002" v="264" actId="478"/>
-          <ac:spMkLst>
-            <pc:docMk/>
-            <pc:sldMk cId="3999338705" sldId="320"/>
-            <ac:spMk id="31749" creationId="{632C5A18-FF70-CA42-A313-DE29E0A291D3}"/>
-          </ac:spMkLst>
-        </pc:spChg>
-        <pc:spChg chg="del">
-          <ac:chgData name="Victor Valotto" userId="f8cd04a3a901a375" providerId="LiveId" clId="{9FE5FF6C-FF80-3A42-8EBA-5C9015AF763A}" dt="2019-04-24T22:02:01.002" v="264" actId="478"/>
-          <ac:spMkLst>
-            <pc:docMk/>
-            <pc:sldMk cId="3999338705" sldId="320"/>
-            <ac:spMk id="31750" creationId="{B0072DE6-7B4C-C04D-8915-6176B655AEAD}"/>
-          </ac:spMkLst>
-        </pc:spChg>
-        <pc:spChg chg="del">
-          <ac:chgData name="Victor Valotto" userId="f8cd04a3a901a375" providerId="LiveId" clId="{9FE5FF6C-FF80-3A42-8EBA-5C9015AF763A}" dt="2019-04-24T22:02:01.002" v="264" actId="478"/>
-          <ac:spMkLst>
-            <pc:docMk/>
-            <pc:sldMk cId="3999338705" sldId="320"/>
-            <ac:spMk id="31751" creationId="{B019EE5F-4690-4F42-B748-B54233E065D2}"/>
-          </ac:spMkLst>
-        </pc:spChg>
-        <pc:spChg chg="del">
-          <ac:chgData name="Victor Valotto" userId="f8cd04a3a901a375" providerId="LiveId" clId="{9FE5FF6C-FF80-3A42-8EBA-5C9015AF763A}" dt="2019-04-24T22:02:01.002" v="264" actId="478"/>
-          <ac:spMkLst>
-            <pc:docMk/>
-            <pc:sldMk cId="3999338705" sldId="320"/>
-            <ac:spMk id="31752" creationId="{51ADD51D-77AC-1D47-AA1B-EBCB1E337DF8}"/>
-          </ac:spMkLst>
-        </pc:spChg>
-        <pc:spChg chg="del">
-          <ac:chgData name="Victor Valotto" userId="f8cd04a3a901a375" providerId="LiveId" clId="{9FE5FF6C-FF80-3A42-8EBA-5C9015AF763A}" dt="2019-04-24T22:02:01.002" v="264" actId="478"/>
-          <ac:spMkLst>
-            <pc:docMk/>
-            <pc:sldMk cId="3999338705" sldId="320"/>
-            <ac:spMk id="31753" creationId="{0921254D-E9FC-FD43-B1D2-A4DE7B274B50}"/>
-          </ac:spMkLst>
-        </pc:spChg>
-        <pc:spChg chg="del">
-          <ac:chgData name="Victor Valotto" userId="f8cd04a3a901a375" providerId="LiveId" clId="{9FE5FF6C-FF80-3A42-8EBA-5C9015AF763A}" dt="2019-04-24T22:02:04.296" v="265" actId="478"/>
-          <ac:spMkLst>
-            <pc:docMk/>
-            <pc:sldMk cId="3999338705" sldId="320"/>
-            <ac:spMk id="31754" creationId="{9F268E92-73E3-C34C-844F-C531998209CF}"/>
-          </ac:spMkLst>
-        </pc:spChg>
-        <pc:spChg chg="del">
-          <ac:chgData name="Victor Valotto" userId="f8cd04a3a901a375" providerId="LiveId" clId="{9FE5FF6C-FF80-3A42-8EBA-5C9015AF763A}" dt="2019-04-24T22:02:01.002" v="264" actId="478"/>
-          <ac:spMkLst>
-            <pc:docMk/>
-            <pc:sldMk cId="3999338705" sldId="320"/>
-            <ac:spMk id="31755" creationId="{6A48D55D-311C-8E41-A7CC-DAC51854D051}"/>
-          </ac:spMkLst>
-        </pc:spChg>
-        <pc:spChg chg="del">
-          <ac:chgData name="Victor Valotto" userId="f8cd04a3a901a375" providerId="LiveId" clId="{9FE5FF6C-FF80-3A42-8EBA-5C9015AF763A}" dt="2019-04-24T22:02:01.002" v="264" actId="478"/>
-          <ac:spMkLst>
-            <pc:docMk/>
-            <pc:sldMk cId="3999338705" sldId="320"/>
-            <ac:spMk id="31756" creationId="{5BF191FC-49A6-2C43-ABE9-186FA827C9CD}"/>
-          </ac:spMkLst>
-        </pc:spChg>
-        <pc:spChg chg="del">
-          <ac:chgData name="Victor Valotto" userId="f8cd04a3a901a375" providerId="LiveId" clId="{9FE5FF6C-FF80-3A42-8EBA-5C9015AF763A}" dt="2019-04-24T22:02:01.002" v="264" actId="478"/>
-          <ac:spMkLst>
-            <pc:docMk/>
-            <pc:sldMk cId="3999338705" sldId="320"/>
-            <ac:spMk id="31757" creationId="{7C49C157-7C20-804A-8B6A-6950BE52956A}"/>
-          </ac:spMkLst>
-        </pc:spChg>
-        <pc:spChg chg="del">
-          <ac:chgData name="Victor Valotto" userId="f8cd04a3a901a375" providerId="LiveId" clId="{9FE5FF6C-FF80-3A42-8EBA-5C9015AF763A}" dt="2019-04-24T22:02:01.002" v="264" actId="478"/>
-          <ac:spMkLst>
-            <pc:docMk/>
-            <pc:sldMk cId="3999338705" sldId="320"/>
-            <ac:spMk id="31758" creationId="{31EAB039-AB93-F04C-9B01-1D7BABEDBD00}"/>
-          </ac:spMkLst>
-        </pc:spChg>
-        <pc:spChg chg="del">
-          <ac:chgData name="Victor Valotto" userId="f8cd04a3a901a375" providerId="LiveId" clId="{9FE5FF6C-FF80-3A42-8EBA-5C9015AF763A}" dt="2019-04-24T22:02:01.002" v="264" actId="478"/>
-          <ac:spMkLst>
-            <pc:docMk/>
-            <pc:sldMk cId="3999338705" sldId="320"/>
-            <ac:spMk id="31759" creationId="{467872D4-505D-AA4F-AD9E-48003430B0AB}"/>
-          </ac:spMkLst>
-        </pc:spChg>
-        <pc:spChg chg="del">
-          <ac:chgData name="Victor Valotto" userId="f8cd04a3a901a375" providerId="LiveId" clId="{9FE5FF6C-FF80-3A42-8EBA-5C9015AF763A}" dt="2019-04-24T22:02:01.002" v="264" actId="478"/>
-          <ac:spMkLst>
-            <pc:docMk/>
-            <pc:sldMk cId="3999338705" sldId="320"/>
-            <ac:spMk id="31760" creationId="{917D09FB-9154-2F41-BC56-EE599215C53E}"/>
-          </ac:spMkLst>
-        </pc:spChg>
-        <pc:grpChg chg="del">
-          <ac:chgData name="Victor Valotto" userId="f8cd04a3a901a375" providerId="LiveId" clId="{9FE5FF6C-FF80-3A42-8EBA-5C9015AF763A}" dt="2019-04-24T22:02:01.002" v="264" actId="478"/>
-          <ac:grpSpMkLst>
-            <pc:docMk/>
-            <pc:sldMk cId="3999338705" sldId="320"/>
-            <ac:grpSpMk id="2" creationId="{560C2342-60CC-184D-B6F9-4DEDF9EEF535}"/>
-          </ac:grpSpMkLst>
-        </pc:grpChg>
-        <pc:grpChg chg="add mod">
-          <ac:chgData name="Victor Valotto" userId="f8cd04a3a901a375" providerId="LiveId" clId="{9FE5FF6C-FF80-3A42-8EBA-5C9015AF763A}" dt="2019-04-24T22:02:35.123" v="268" actId="1076"/>
-          <ac:grpSpMkLst>
-            <pc:docMk/>
-            <pc:sldMk cId="3999338705" sldId="320"/>
-            <ac:grpSpMk id="23" creationId="{099C244E-7788-5642-9E69-812E007AA6AC}"/>
-          </ac:grpSpMkLst>
-        </pc:grpChg>
-      </pc:sldChg>
-      <pc:sldChg chg="add">
-        <pc:chgData name="Victor Valotto" userId="f8cd04a3a901a375" providerId="LiveId" clId="{9FE5FF6C-FF80-3A42-8EBA-5C9015AF763A}" dt="2019-04-23T22:27:10.037" v="101"/>
-        <pc:sldMkLst>
-          <pc:docMk/>
-          <pc:sldMk cId="3147269232" sldId="321"/>
-        </pc:sldMkLst>
-      </pc:sldChg>
-      <pc:sldChg chg="add">
-        <pc:chgData name="Victor Valotto" userId="f8cd04a3a901a375" providerId="LiveId" clId="{9FE5FF6C-FF80-3A42-8EBA-5C9015AF763A}" dt="2019-04-24T22:03:50.341" v="273"/>
-        <pc:sldMkLst>
-          <pc:docMk/>
-          <pc:sldMk cId="2945165694" sldId="322"/>
-        </pc:sldMkLst>
-      </pc:sldChg>
-      <pc:sldChg chg="add">
-        <pc:chgData name="Victor Valotto" userId="f8cd04a3a901a375" providerId="LiveId" clId="{9FE5FF6C-FF80-3A42-8EBA-5C9015AF763A}" dt="2019-04-24T22:35:56.223" v="282"/>
-        <pc:sldMkLst>
-          <pc:docMk/>
-          <pc:sldMk cId="1048498965" sldId="323"/>
-        </pc:sldMkLst>
-      </pc:sldChg>
-      <pc:sldChg chg="modSp add">
-        <pc:chgData name="Victor Valotto" userId="f8cd04a3a901a375" providerId="LiveId" clId="{9FE5FF6C-FF80-3A42-8EBA-5C9015AF763A}" dt="2019-04-24T21:28:23.728" v="154" actId="1076"/>
-        <pc:sldMkLst>
-          <pc:docMk/>
-          <pc:sldMk cId="1989699599" sldId="324"/>
-        </pc:sldMkLst>
-        <pc:spChg chg="mod">
-          <ac:chgData name="Victor Valotto" userId="f8cd04a3a901a375" providerId="LiveId" clId="{9FE5FF6C-FF80-3A42-8EBA-5C9015AF763A}" dt="2019-04-24T21:28:17.169" v="153" actId="1076"/>
-          <ac:spMkLst>
-            <pc:docMk/>
-            <pc:sldMk cId="1989699599" sldId="324"/>
-            <ac:spMk id="15385" creationId="{33B00073-6A86-9441-B850-4D34B43C0CB6}"/>
-          </ac:spMkLst>
-        </pc:spChg>
-        <pc:graphicFrameChg chg="mod">
-          <ac:chgData name="Victor Valotto" userId="f8cd04a3a901a375" providerId="LiveId" clId="{9FE5FF6C-FF80-3A42-8EBA-5C9015AF763A}" dt="2019-04-24T21:28:23.728" v="154" actId="1076"/>
-          <ac:graphicFrameMkLst>
-            <pc:docMk/>
-            <pc:sldMk cId="1989699599" sldId="324"/>
-            <ac:graphicFrameMk id="79942" creationId="{18826B92-8049-6D4F-8A91-5CD654ADAC65}"/>
-          </ac:graphicFrameMkLst>
-        </pc:graphicFrameChg>
-      </pc:sldChg>
-      <pc:sldChg chg="add">
-        <pc:chgData name="Victor Valotto" userId="f8cd04a3a901a375" providerId="LiveId" clId="{9FE5FF6C-FF80-3A42-8EBA-5C9015AF763A}" dt="2019-04-24T22:03:50.341" v="273"/>
-        <pc:sldMkLst>
-          <pc:docMk/>
-          <pc:sldMk cId="4032146959" sldId="326"/>
-        </pc:sldMkLst>
-      </pc:sldChg>
-      <pc:sldChg chg="add">
-        <pc:chgData name="Victor Valotto" userId="f8cd04a3a901a375" providerId="LiveId" clId="{9FE5FF6C-FF80-3A42-8EBA-5C9015AF763A}" dt="2019-04-24T22:14:25.441" v="277"/>
-        <pc:sldMkLst>
-          <pc:docMk/>
-          <pc:sldMk cId="2871384523" sldId="337"/>
-        </pc:sldMkLst>
-      </pc:sldChg>
-      <pc:sldChg chg="add">
-        <pc:chgData name="Victor Valotto" userId="f8cd04a3a901a375" providerId="LiveId" clId="{9FE5FF6C-FF80-3A42-8EBA-5C9015AF763A}" dt="2019-04-24T22:38:06.158" v="286"/>
-        <pc:sldMkLst>
-          <pc:docMk/>
-          <pc:sldMk cId="3269276833" sldId="338"/>
-        </pc:sldMkLst>
-      </pc:sldChg>
-      <pc:sldChg chg="add">
-        <pc:chgData name="Victor Valotto" userId="f8cd04a3a901a375" providerId="LiveId" clId="{9FE5FF6C-FF80-3A42-8EBA-5C9015AF763A}" dt="2019-04-24T22:38:06.158" v="286"/>
-        <pc:sldMkLst>
-          <pc:docMk/>
-          <pc:sldMk cId="1899643126" sldId="339"/>
-        </pc:sldMkLst>
-      </pc:sldChg>
-      <pc:sldChg chg="add">
-        <pc:chgData name="Victor Valotto" userId="f8cd04a3a901a375" providerId="LiveId" clId="{9FE5FF6C-FF80-3A42-8EBA-5C9015AF763A}" dt="2019-04-24T21:44:24.245" v="194"/>
-        <pc:sldMkLst>
-          <pc:docMk/>
-          <pc:sldMk cId="1177592025" sldId="340"/>
-        </pc:sldMkLst>
-      </pc:sldChg>
-      <pc:sldChg chg="modSp add">
-        <pc:chgData name="Victor Valotto" userId="f8cd04a3a901a375" providerId="LiveId" clId="{9FE5FF6C-FF80-3A42-8EBA-5C9015AF763A}" dt="2019-04-24T21:39:21.678" v="176" actId="1076"/>
-        <pc:sldMkLst>
-          <pc:docMk/>
-          <pc:sldMk cId="1040739887" sldId="341"/>
-        </pc:sldMkLst>
-        <pc:spChg chg="mod">
-          <ac:chgData name="Victor Valotto" userId="f8cd04a3a901a375" providerId="LiveId" clId="{9FE5FF6C-FF80-3A42-8EBA-5C9015AF763A}" dt="2019-04-24T21:39:10.450" v="173" actId="1076"/>
-          <ac:spMkLst>
-            <pc:docMk/>
-            <pc:sldMk cId="1040739887" sldId="341"/>
-            <ac:spMk id="25602" creationId="{F0AAFAFF-4891-F64A-82DC-4D61D5BF64AF}"/>
-          </ac:spMkLst>
-        </pc:spChg>
-        <pc:graphicFrameChg chg="mod modGraphic">
-          <ac:chgData name="Victor Valotto" userId="f8cd04a3a901a375" providerId="LiveId" clId="{9FE5FF6C-FF80-3A42-8EBA-5C9015AF763A}" dt="2019-04-24T21:39:21.678" v="176" actId="1076"/>
-          <ac:graphicFrameMkLst>
-            <pc:docMk/>
-            <pc:sldMk cId="1040739887" sldId="341"/>
-            <ac:graphicFrameMk id="6" creationId="{2FE1CF87-EC97-EA41-8842-3113BB720C83}"/>
-          </ac:graphicFrameMkLst>
-        </pc:graphicFrameChg>
-      </pc:sldChg>
-      <pc:sldChg chg="addSp delSp modSp add">
-        <pc:chgData name="Victor Valotto" userId="f8cd04a3a901a375" providerId="LiveId" clId="{9FE5FF6C-FF80-3A42-8EBA-5C9015AF763A}" dt="2019-04-24T21:39:59.286" v="186" actId="1076"/>
-        <pc:sldMkLst>
-          <pc:docMk/>
-          <pc:sldMk cId="4214295060" sldId="342"/>
-        </pc:sldMkLst>
-        <pc:spChg chg="add del mod">
-          <ac:chgData name="Victor Valotto" userId="f8cd04a3a901a375" providerId="LiveId" clId="{9FE5FF6C-FF80-3A42-8EBA-5C9015AF763A}" dt="2019-04-24T21:39:54.122" v="184" actId="478"/>
-          <ac:spMkLst>
-            <pc:docMk/>
-            <pc:sldMk cId="4214295060" sldId="342"/>
-            <ac:spMk id="4" creationId="{D71A6F2C-1290-EE4F-803D-52BE3ECEC637}"/>
-          </ac:spMkLst>
-        </pc:spChg>
-        <pc:spChg chg="mod">
-          <ac:chgData name="Victor Valotto" userId="f8cd04a3a901a375" providerId="LiveId" clId="{9FE5FF6C-FF80-3A42-8EBA-5C9015AF763A}" dt="2019-04-24T21:39:42.648" v="180" actId="14100"/>
-          <ac:spMkLst>
-            <pc:docMk/>
-            <pc:sldMk cId="4214295060" sldId="342"/>
-            <ac:spMk id="26626" creationId="{23052BE8-ED0B-6649-AF54-478992875A15}"/>
-          </ac:spMkLst>
-        </pc:spChg>
-        <pc:spChg chg="mod">
-          <ac:chgData name="Victor Valotto" userId="f8cd04a3a901a375" providerId="LiveId" clId="{9FE5FF6C-FF80-3A42-8EBA-5C9015AF763A}" dt="2019-04-24T21:39:59.286" v="186" actId="1076"/>
-          <ac:spMkLst>
-            <pc:docMk/>
-            <pc:sldMk cId="4214295060" sldId="342"/>
-            <ac:spMk id="26627" creationId="{4CF38A79-599C-0946-91D8-193C25A550C7}"/>
-          </ac:spMkLst>
-        </pc:spChg>
-        <pc:picChg chg="del">
-          <ac:chgData name="Victor Valotto" userId="f8cd04a3a901a375" providerId="LiveId" clId="{9FE5FF6C-FF80-3A42-8EBA-5C9015AF763A}" dt="2019-04-24T21:39:51.065" v="183" actId="478"/>
-          <ac:picMkLst>
-            <pc:docMk/>
-            <pc:sldMk cId="4214295060" sldId="342"/>
-            <ac:picMk id="2" creationId="{D0A812CC-143F-F84F-8073-BD5EC009A161}"/>
-          </ac:picMkLst>
-        </pc:picChg>
-        <pc:picChg chg="mod">
-          <ac:chgData name="Victor Valotto" userId="f8cd04a3a901a375" providerId="LiveId" clId="{9FE5FF6C-FF80-3A42-8EBA-5C9015AF763A}" dt="2019-04-24T21:39:56.528" v="185" actId="1076"/>
-          <ac:picMkLst>
-            <pc:docMk/>
-            <pc:sldMk cId="4214295060" sldId="342"/>
-            <ac:picMk id="26631" creationId="{757C3C8E-F505-D947-AECF-9DC6A18B7CBE}"/>
-          </ac:picMkLst>
-        </pc:picChg>
-      </pc:sldChg>
-      <pc:sldChg chg="addSp delSp modSp add">
-        <pc:chgData name="Victor Valotto" userId="f8cd04a3a901a375" providerId="LiveId" clId="{9FE5FF6C-FF80-3A42-8EBA-5C9015AF763A}" dt="2019-04-24T21:41:23.584" v="193" actId="1076"/>
-        <pc:sldMkLst>
-          <pc:docMk/>
-          <pc:sldMk cId="2440349609" sldId="344"/>
-        </pc:sldMkLst>
-        <pc:spChg chg="mod">
-          <ac:chgData name="Victor Valotto" userId="f8cd04a3a901a375" providerId="LiveId" clId="{9FE5FF6C-FF80-3A42-8EBA-5C9015AF763A}" dt="2019-04-24T21:41:23.584" v="193" actId="1076"/>
-          <ac:spMkLst>
-            <pc:docMk/>
-            <pc:sldMk cId="2440349609" sldId="344"/>
-            <ac:spMk id="6" creationId="{2F7A1C2A-12DF-E842-A0BA-66C04BCF8FDD}"/>
-          </ac:spMkLst>
-        </pc:spChg>
-        <pc:spChg chg="mod">
-          <ac:chgData name="Victor Valotto" userId="f8cd04a3a901a375" providerId="LiveId" clId="{9FE5FF6C-FF80-3A42-8EBA-5C9015AF763A}" dt="2019-04-24T21:41:23.584" v="193" actId="1076"/>
-          <ac:spMkLst>
-            <pc:docMk/>
-            <pc:sldMk cId="2440349609" sldId="344"/>
-            <ac:spMk id="7" creationId="{72DB62D6-4964-DD4E-8B30-81EB554F8521}"/>
-          </ac:spMkLst>
-        </pc:spChg>
-        <pc:spChg chg="mod">
-          <ac:chgData name="Victor Valotto" userId="f8cd04a3a901a375" providerId="LiveId" clId="{9FE5FF6C-FF80-3A42-8EBA-5C9015AF763A}" dt="2019-04-24T21:41:23.584" v="193" actId="1076"/>
-          <ac:spMkLst>
-            <pc:docMk/>
-            <pc:sldMk cId="2440349609" sldId="344"/>
-            <ac:spMk id="8" creationId="{AB8E3432-5AFC-D342-AAF3-F4940EAAC43B}"/>
-          </ac:spMkLst>
-        </pc:spChg>
-        <pc:spChg chg="mod">
-          <ac:chgData name="Victor Valotto" userId="f8cd04a3a901a375" providerId="LiveId" clId="{9FE5FF6C-FF80-3A42-8EBA-5C9015AF763A}" dt="2019-04-24T21:41:23.584" v="193" actId="1076"/>
-          <ac:spMkLst>
-            <pc:docMk/>
-            <pc:sldMk cId="2440349609" sldId="344"/>
-            <ac:spMk id="9" creationId="{57CC82A4-D10B-974C-9B07-851361E46460}"/>
-          </ac:spMkLst>
-        </pc:spChg>
-        <pc:spChg chg="mod">
-          <ac:chgData name="Victor Valotto" userId="f8cd04a3a901a375" providerId="LiveId" clId="{9FE5FF6C-FF80-3A42-8EBA-5C9015AF763A}" dt="2019-04-24T21:41:23.584" v="193" actId="1076"/>
-          <ac:spMkLst>
-            <pc:docMk/>
-            <pc:sldMk cId="2440349609" sldId="344"/>
-            <ac:spMk id="10" creationId="{5C49E730-6D3B-D542-BE8A-BF094717059C}"/>
-          </ac:spMkLst>
-        </pc:spChg>
-        <pc:spChg chg="mod">
-          <ac:chgData name="Victor Valotto" userId="f8cd04a3a901a375" providerId="LiveId" clId="{9FE5FF6C-FF80-3A42-8EBA-5C9015AF763A}" dt="2019-04-24T21:41:23.584" v="193" actId="1076"/>
-          <ac:spMkLst>
-            <pc:docMk/>
-            <pc:sldMk cId="2440349609" sldId="344"/>
-            <ac:spMk id="11" creationId="{CD65AAF8-58B7-A44B-88CF-B28A7B82AB02}"/>
-          </ac:spMkLst>
-        </pc:spChg>
-        <pc:spChg chg="mod">
-          <ac:chgData name="Victor Valotto" userId="f8cd04a3a901a375" providerId="LiveId" clId="{9FE5FF6C-FF80-3A42-8EBA-5C9015AF763A}" dt="2019-04-24T21:41:23.584" v="193" actId="1076"/>
-          <ac:spMkLst>
-            <pc:docMk/>
-            <pc:sldMk cId="2440349609" sldId="344"/>
-            <ac:spMk id="12" creationId="{A591E04E-69FA-0D4B-BC79-E69A76379D5C}"/>
-          </ac:spMkLst>
-        </pc:spChg>
-        <pc:spChg chg="mod">
-          <ac:chgData name="Victor Valotto" userId="f8cd04a3a901a375" providerId="LiveId" clId="{9FE5FF6C-FF80-3A42-8EBA-5C9015AF763A}" dt="2019-04-24T21:41:23.584" v="193" actId="1076"/>
-          <ac:spMkLst>
-            <pc:docMk/>
-            <pc:sldMk cId="2440349609" sldId="344"/>
-            <ac:spMk id="13" creationId="{EBD76FDB-C0A0-814C-824D-27072AB305E2}"/>
-          </ac:spMkLst>
-        </pc:spChg>
-        <pc:spChg chg="mod">
-          <ac:chgData name="Victor Valotto" userId="f8cd04a3a901a375" providerId="LiveId" clId="{9FE5FF6C-FF80-3A42-8EBA-5C9015AF763A}" dt="2019-04-24T21:41:23.584" v="193" actId="1076"/>
-          <ac:spMkLst>
-            <pc:docMk/>
-            <pc:sldMk cId="2440349609" sldId="344"/>
-            <ac:spMk id="14" creationId="{F22B7160-C339-024B-B735-E8910102B008}"/>
-          </ac:spMkLst>
-        </pc:spChg>
-        <pc:spChg chg="mod">
-          <ac:chgData name="Victor Valotto" userId="f8cd04a3a901a375" providerId="LiveId" clId="{9FE5FF6C-FF80-3A42-8EBA-5C9015AF763A}" dt="2019-04-24T21:41:23.584" v="193" actId="1076"/>
-          <ac:spMkLst>
-            <pc:docMk/>
-            <pc:sldMk cId="2440349609" sldId="344"/>
-            <ac:spMk id="15" creationId="{C4AB456E-CE6E-5746-8A12-CBE4E72A8D3E}"/>
-          </ac:spMkLst>
-        </pc:spChg>
-        <pc:spChg chg="mod">
-          <ac:chgData name="Victor Valotto" userId="f8cd04a3a901a375" providerId="LiveId" clId="{9FE5FF6C-FF80-3A42-8EBA-5C9015AF763A}" dt="2019-04-24T21:40:10.615" v="188" actId="1076"/>
-          <ac:spMkLst>
-            <pc:docMk/>
-            <pc:sldMk cId="2440349609" sldId="344"/>
-            <ac:spMk id="28674" creationId="{19E56CB8-2293-EC47-9002-711F7EB61FD8}"/>
-          </ac:spMkLst>
-        </pc:spChg>
-        <pc:spChg chg="add del">
-          <ac:chgData name="Victor Valotto" userId="f8cd04a3a901a375" providerId="LiveId" clId="{9FE5FF6C-FF80-3A42-8EBA-5C9015AF763A}" dt="2019-04-24T21:40:51.409" v="191" actId="478"/>
-          <ac:spMkLst>
-            <pc:docMk/>
-            <pc:sldMk cId="2440349609" sldId="344"/>
-            <ac:spMk id="28675" creationId="{09A0670A-90EA-D143-92D3-CDDC0569341D}"/>
-          </ac:spMkLst>
-        </pc:spChg>
-      </pc:sldChg>
-      <pc:sldChg chg="add">
-        <pc:chgData name="Victor Valotto" userId="f8cd04a3a901a375" providerId="LiveId" clId="{9FE5FF6C-FF80-3A42-8EBA-5C9015AF763A}" dt="2019-04-24T22:15:19.408" v="279"/>
-        <pc:sldMkLst>
-          <pc:docMk/>
-          <pc:sldMk cId="1279871457" sldId="345"/>
-        </pc:sldMkLst>
-      </pc:sldChg>
-      <pc:sldChg chg="add">
-        <pc:chgData name="Victor Valotto" userId="f8cd04a3a901a375" providerId="LiveId" clId="{9FE5FF6C-FF80-3A42-8EBA-5C9015AF763A}" dt="2019-04-24T22:15:51.106" v="280"/>
-        <pc:sldMkLst>
-          <pc:docMk/>
-          <pc:sldMk cId="3497987993" sldId="352"/>
-        </pc:sldMkLst>
-      </pc:sldChg>
-      <pc:sldChg chg="add">
-        <pc:chgData name="Victor Valotto" userId="f8cd04a3a901a375" providerId="LiveId" clId="{9FE5FF6C-FF80-3A42-8EBA-5C9015AF763A}" dt="2019-04-24T22:16:10.557" v="281"/>
-        <pc:sldMkLst>
-          <pc:docMk/>
-          <pc:sldMk cId="2664622692" sldId="353"/>
-        </pc:sldMkLst>
-      </pc:sldChg>
-      <pc:sldChg chg="modSp add">
-        <pc:chgData name="Victor Valotto" userId="f8cd04a3a901a375" providerId="LiveId" clId="{9FE5FF6C-FF80-3A42-8EBA-5C9015AF763A}" dt="2019-04-24T21:29:37.271" v="166" actId="1076"/>
-        <pc:sldMkLst>
-          <pc:docMk/>
-          <pc:sldMk cId="22914173" sldId="369"/>
-        </pc:sldMkLst>
-        <pc:spChg chg="mod">
-          <ac:chgData name="Victor Valotto" userId="f8cd04a3a901a375" providerId="LiveId" clId="{9FE5FF6C-FF80-3A42-8EBA-5C9015AF763A}" dt="2019-04-24T21:29:37.271" v="166" actId="1076"/>
-          <ac:spMkLst>
-            <pc:docMk/>
-            <pc:sldMk cId="22914173" sldId="369"/>
-            <ac:spMk id="54274" creationId="{DC8CFA97-DE9E-0943-858E-C6AC6F6E4906}"/>
-          </ac:spMkLst>
-        </pc:spChg>
-        <pc:graphicFrameChg chg="mod">
-          <ac:chgData name="Victor Valotto" userId="f8cd04a3a901a375" providerId="LiveId" clId="{9FE5FF6C-FF80-3A42-8EBA-5C9015AF763A}" dt="2019-04-24T21:29:32.972" v="165" actId="1076"/>
-          <ac:graphicFrameMkLst>
-            <pc:docMk/>
-            <pc:sldMk cId="22914173" sldId="369"/>
-            <ac:graphicFrameMk id="6" creationId="{23367CC1-28BD-414D-AEB3-A4D8FEE13DE3}"/>
-          </ac:graphicFrameMkLst>
-        </pc:graphicFrameChg>
-      </pc:sldChg>
-      <pc:sldChg chg="modSp add">
-        <pc:chgData name="Victor Valotto" userId="f8cd04a3a901a375" providerId="LiveId" clId="{9FE5FF6C-FF80-3A42-8EBA-5C9015AF763A}" dt="2019-04-24T21:30:53.770" v="171" actId="1076"/>
-        <pc:sldMkLst>
-          <pc:docMk/>
-          <pc:sldMk cId="434562061" sldId="370"/>
-        </pc:sldMkLst>
-        <pc:spChg chg="mod">
-          <ac:chgData name="Victor Valotto" userId="f8cd04a3a901a375" providerId="LiveId" clId="{9FE5FF6C-FF80-3A42-8EBA-5C9015AF763A}" dt="2019-04-24T21:30:38.740" v="168" actId="1076"/>
-          <ac:spMkLst>
-            <pc:docMk/>
-            <pc:sldMk cId="434562061" sldId="370"/>
-            <ac:spMk id="55298" creationId="{AB51C16A-0999-C047-9743-C374FB19039C}"/>
-          </ac:spMkLst>
-        </pc:spChg>
-        <pc:graphicFrameChg chg="mod modGraphic">
-          <ac:chgData name="Victor Valotto" userId="f8cd04a3a901a375" providerId="LiveId" clId="{9FE5FF6C-FF80-3A42-8EBA-5C9015AF763A}" dt="2019-04-24T21:30:53.770" v="171" actId="1076"/>
-          <ac:graphicFrameMkLst>
-            <pc:docMk/>
-            <pc:sldMk cId="434562061" sldId="370"/>
-            <ac:graphicFrameMk id="6" creationId="{262C6C30-45AA-7D4D-8AE9-EFACAC88BA29}"/>
-          </ac:graphicFrameMkLst>
-        </pc:graphicFrameChg>
-      </pc:sldChg>
-      <pc:sldChg chg="add del">
-        <pc:chgData name="Victor Valotto" userId="f8cd04a3a901a375" providerId="LiveId" clId="{9FE5FF6C-FF80-3A42-8EBA-5C9015AF763A}" dt="2019-04-24T21:59:05.644" v="244" actId="2696"/>
-        <pc:sldMkLst>
-          <pc:docMk/>
-          <pc:sldMk cId="401213395" sldId="371"/>
-        </pc:sldMkLst>
-      </pc:sldChg>
-      <pc:sldChg chg="modSp add">
-        <pc:chgData name="Victor Valotto" userId="f8cd04a3a901a375" providerId="LiveId" clId="{9FE5FF6C-FF80-3A42-8EBA-5C9015AF763A}" dt="2019-04-24T21:59:17.470" v="248" actId="1076"/>
-        <pc:sldMkLst>
-          <pc:docMk/>
-          <pc:sldMk cId="3205300195" sldId="372"/>
-        </pc:sldMkLst>
-        <pc:spChg chg="mod">
-          <ac:chgData name="Victor Valotto" userId="f8cd04a3a901a375" providerId="LiveId" clId="{9FE5FF6C-FF80-3A42-8EBA-5C9015AF763A}" dt="2019-04-24T21:59:12.508" v="247" actId="1076"/>
-          <ac:spMkLst>
-            <pc:docMk/>
-            <pc:sldMk cId="3205300195" sldId="372"/>
-            <ac:spMk id="23554" creationId="{4281F69D-803C-4C41-A030-8C8D9FF94ED1}"/>
-          </ac:spMkLst>
-        </pc:spChg>
-        <pc:graphicFrameChg chg="mod">
-          <ac:chgData name="Victor Valotto" userId="f8cd04a3a901a375" providerId="LiveId" clId="{9FE5FF6C-FF80-3A42-8EBA-5C9015AF763A}" dt="2019-04-24T21:59:17.470" v="248" actId="1076"/>
-          <ac:graphicFrameMkLst>
-            <pc:docMk/>
-            <pc:sldMk cId="3205300195" sldId="372"/>
-            <ac:graphicFrameMk id="6" creationId="{B2DEACAF-2B70-1342-9CB8-5617CBDF6E66}"/>
-          </ac:graphicFrameMkLst>
-        </pc:graphicFrameChg>
-      </pc:sldChg>
-      <pc:sldChg chg="modSp add del">
-        <pc:chgData name="Victor Valotto" userId="f8cd04a3a901a375" providerId="LiveId" clId="{9FE5FF6C-FF80-3A42-8EBA-5C9015AF763A}" dt="2019-04-24T22:00:19.272" v="262" actId="2696"/>
-        <pc:sldMkLst>
-          <pc:docMk/>
-          <pc:sldMk cId="362893443" sldId="373"/>
-        </pc:sldMkLst>
-        <pc:spChg chg="mod">
-          <ac:chgData name="Victor Valotto" userId="f8cd04a3a901a375" providerId="LiveId" clId="{9FE5FF6C-FF80-3A42-8EBA-5C9015AF763A}" dt="2019-04-24T21:59:25.783" v="250" actId="1076"/>
-          <ac:spMkLst>
-            <pc:docMk/>
-            <pc:sldMk cId="362893443" sldId="373"/>
-            <ac:spMk id="24578" creationId="{A39651E6-700E-C743-A579-0B42C0ADE9CD}"/>
-          </ac:spMkLst>
-        </pc:spChg>
-        <pc:graphicFrameChg chg="mod">
-          <ac:chgData name="Victor Valotto" userId="f8cd04a3a901a375" providerId="LiveId" clId="{9FE5FF6C-FF80-3A42-8EBA-5C9015AF763A}" dt="2019-04-24T21:59:30.712" v="251" actId="1076"/>
-          <ac:graphicFrameMkLst>
-            <pc:docMk/>
-            <pc:sldMk cId="362893443" sldId="373"/>
-            <ac:graphicFrameMk id="6" creationId="{1080B99F-AC67-0346-815C-A31870B91BF3}"/>
-          </ac:graphicFrameMkLst>
-        </pc:graphicFrameChg>
-      </pc:sldChg>
-      <pc:sldChg chg="modSp add">
-        <pc:chgData name="Victor Valotto" userId="f8cd04a3a901a375" providerId="LiveId" clId="{9FE5FF6C-FF80-3A42-8EBA-5C9015AF763A}" dt="2019-04-24T22:00:15.138" v="261" actId="1076"/>
-        <pc:sldMkLst>
-          <pc:docMk/>
-          <pc:sldMk cId="3845024202" sldId="374"/>
-        </pc:sldMkLst>
-        <pc:spChg chg="mod">
-          <ac:chgData name="Victor Valotto" userId="f8cd04a3a901a375" providerId="LiveId" clId="{9FE5FF6C-FF80-3A42-8EBA-5C9015AF763A}" dt="2019-04-24T22:00:15.138" v="261" actId="1076"/>
-          <ac:spMkLst>
-            <pc:docMk/>
-            <pc:sldMk cId="3845024202" sldId="374"/>
-            <ac:spMk id="3" creationId="{9807D5F7-AF39-2A47-A279-C80B5DA5B0A8}"/>
-          </ac:spMkLst>
-        </pc:spChg>
-        <pc:spChg chg="mod">
-          <ac:chgData name="Victor Valotto" userId="f8cd04a3a901a375" providerId="LiveId" clId="{9FE5FF6C-FF80-3A42-8EBA-5C9015AF763A}" dt="2019-04-24T22:00:09.085" v="260" actId="14100"/>
-          <ac:spMkLst>
-            <pc:docMk/>
-            <pc:sldMk cId="3845024202" sldId="374"/>
-            <ac:spMk id="26626" creationId="{D469257E-8D07-CC47-ABC1-ACC9322AA049}"/>
-          </ac:spMkLst>
-        </pc:spChg>
-      </pc:sldChg>
-      <pc:sldChg chg="add">
-        <pc:chgData name="Victor Valotto" userId="f8cd04a3a901a375" providerId="LiveId" clId="{9FE5FF6C-FF80-3A42-8EBA-5C9015AF763A}" dt="2019-04-24T22:13:40.965" v="276"/>
-        <pc:sldMkLst>
-          <pc:docMk/>
-          <pc:sldMk cId="4212803705" sldId="375"/>
-        </pc:sldMkLst>
-      </pc:sldChg>
-      <pc:sldChg chg="add">
-        <pc:chgData name="Victor Valotto" userId="f8cd04a3a901a375" providerId="LiveId" clId="{9FE5FF6C-FF80-3A42-8EBA-5C9015AF763A}" dt="2019-04-24T22:15:13.326" v="278"/>
-        <pc:sldMkLst>
-          <pc:docMk/>
-          <pc:sldMk cId="4061230483" sldId="376"/>
-        </pc:sldMkLst>
-      </pc:sldChg>
-      <pc:sldChg chg="add">
-        <pc:chgData name="Victor Valotto" userId="f8cd04a3a901a375" providerId="LiveId" clId="{9FE5FF6C-FF80-3A42-8EBA-5C9015AF763A}" dt="2019-04-24T22:35:56.223" v="282"/>
-        <pc:sldMkLst>
-          <pc:docMk/>
-          <pc:sldMk cId="2369134925" sldId="377"/>
-        </pc:sldMkLst>
-      </pc:sldChg>
-      <pc:sldChg chg="add">
-        <pc:chgData name="Victor Valotto" userId="f8cd04a3a901a375" providerId="LiveId" clId="{9FE5FF6C-FF80-3A42-8EBA-5C9015AF763A}" dt="2019-04-24T22:35:56.223" v="282"/>
-        <pc:sldMkLst>
-          <pc:docMk/>
-          <pc:sldMk cId="988566739" sldId="378"/>
-        </pc:sldMkLst>
-      </pc:sldChg>
-      <pc:sldChg chg="add">
-        <pc:chgData name="Victor Valotto" userId="f8cd04a3a901a375" providerId="LiveId" clId="{9FE5FF6C-FF80-3A42-8EBA-5C9015AF763A}" dt="2019-04-24T22:35:56.223" v="282"/>
-        <pc:sldMkLst>
-          <pc:docMk/>
-          <pc:sldMk cId="3340815330" sldId="379"/>
-        </pc:sldMkLst>
-      </pc:sldChg>
-      <pc:sldChg chg="add del">
-        <pc:chgData name="Victor Valotto" userId="f8cd04a3a901a375" providerId="LiveId" clId="{9FE5FF6C-FF80-3A42-8EBA-5C9015AF763A}" dt="2019-04-24T22:36:17.028" v="283" actId="2696"/>
-        <pc:sldMkLst>
-          <pc:docMk/>
-          <pc:sldMk cId="3485826618" sldId="380"/>
-        </pc:sldMkLst>
-      </pc:sldChg>
-      <pc:sldChg chg="add del">
-        <pc:chgData name="Victor Valotto" userId="f8cd04a3a901a375" providerId="LiveId" clId="{9FE5FF6C-FF80-3A42-8EBA-5C9015AF763A}" dt="2019-04-24T22:36:18.391" v="285" actId="2696"/>
-        <pc:sldMkLst>
-          <pc:docMk/>
-          <pc:sldMk cId="309150333" sldId="381"/>
-        </pc:sldMkLst>
-      </pc:sldChg>
-      <pc:sldChg chg="add">
-        <pc:chgData name="Victor Valotto" userId="f8cd04a3a901a375" providerId="LiveId" clId="{9FE5FF6C-FF80-3A42-8EBA-5C9015AF763A}" dt="2019-04-24T22:35:56.223" v="282"/>
-        <pc:sldMkLst>
-          <pc:docMk/>
-          <pc:sldMk cId="1723155486" sldId="382"/>
-        </pc:sldMkLst>
-      </pc:sldChg>
-      <pc:sldChg chg="add">
-        <pc:chgData name="Victor Valotto" userId="f8cd04a3a901a375" providerId="LiveId" clId="{9FE5FF6C-FF80-3A42-8EBA-5C9015AF763A}" dt="2019-04-24T22:35:56.223" v="282"/>
-        <pc:sldMkLst>
-          <pc:docMk/>
-          <pc:sldMk cId="779270005" sldId="383"/>
-        </pc:sldMkLst>
-      </pc:sldChg>
-      <pc:sldChg chg="add">
-        <pc:chgData name="Victor Valotto" userId="f8cd04a3a901a375" providerId="LiveId" clId="{9FE5FF6C-FF80-3A42-8EBA-5C9015AF763A}" dt="2019-04-24T22:35:56.223" v="282"/>
-        <pc:sldMkLst>
-          <pc:docMk/>
-          <pc:sldMk cId="3142209153" sldId="384"/>
-        </pc:sldMkLst>
-      </pc:sldChg>
-      <pc:sldChg chg="add">
-        <pc:chgData name="Victor Valotto" userId="f8cd04a3a901a375" providerId="LiveId" clId="{9FE5FF6C-FF80-3A42-8EBA-5C9015AF763A}" dt="2019-04-24T22:35:56.223" v="282"/>
-        <pc:sldMkLst>
-          <pc:docMk/>
-          <pc:sldMk cId="597847063" sldId="385"/>
-        </pc:sldMkLst>
-      </pc:sldChg>
-      <pc:sldChg chg="add">
-        <pc:chgData name="Victor Valotto" userId="f8cd04a3a901a375" providerId="LiveId" clId="{9FE5FF6C-FF80-3A42-8EBA-5C9015AF763A}" dt="2019-04-24T22:35:56.223" v="282"/>
-        <pc:sldMkLst>
-          <pc:docMk/>
-          <pc:sldMk cId="2163301324" sldId="386"/>
-        </pc:sldMkLst>
-      </pc:sldChg>
-      <pc:sldChg chg="add del">
-        <pc:chgData name="Victor Valotto" userId="f8cd04a3a901a375" providerId="LiveId" clId="{9FE5FF6C-FF80-3A42-8EBA-5C9015AF763A}" dt="2019-04-24T22:38:09.399" v="287" actId="2696"/>
-        <pc:sldMkLst>
-          <pc:docMk/>
-          <pc:sldMk cId="890496745" sldId="387"/>
-        </pc:sldMkLst>
-      </pc:sldChg>
-      <pc:sldChg chg="add">
-        <pc:chgData name="Victor Valotto" userId="f8cd04a3a901a375" providerId="LiveId" clId="{9FE5FF6C-FF80-3A42-8EBA-5C9015AF763A}" dt="2019-04-24T22:38:06.158" v="286"/>
-        <pc:sldMkLst>
-          <pc:docMk/>
-          <pc:sldMk cId="2683122247" sldId="388"/>
-        </pc:sldMkLst>
-      </pc:sldChg>
-      <pc:sldMasterChg chg="delSldLayout modSldLayout">
-        <pc:chgData name="Victor Valotto" userId="f8cd04a3a901a375" providerId="LiveId" clId="{9FE5FF6C-FF80-3A42-8EBA-5C9015AF763A}" dt="2019-04-24T22:36:17.051" v="284" actId="2696"/>
-        <pc:sldMasterMkLst>
-          <pc:docMk/>
-          <pc:sldMasterMk cId="0" sldId="2147483840"/>
-        </pc:sldMasterMkLst>
-        <pc:sldLayoutChg chg="delSp">
-          <pc:chgData name="Victor Valotto" userId="f8cd04a3a901a375" providerId="LiveId" clId="{9FE5FF6C-FF80-3A42-8EBA-5C9015AF763A}" dt="2019-04-24T21:29:00.380" v="156" actId="478"/>
-          <pc:sldLayoutMkLst>
-            <pc:docMk/>
-            <pc:sldMasterMk cId="0" sldId="2147483840"/>
-            <pc:sldLayoutMk cId="1096585919" sldId="2147483853"/>
-          </pc:sldLayoutMkLst>
-          <pc:picChg chg="del">
-            <ac:chgData name="Victor Valotto" userId="f8cd04a3a901a375" providerId="LiveId" clId="{9FE5FF6C-FF80-3A42-8EBA-5C9015AF763A}" dt="2019-04-24T21:28:57.604" v="155" actId="478"/>
-            <ac:picMkLst>
-              <pc:docMk/>
-              <pc:sldMasterMk cId="0" sldId="2147483840"/>
-              <pc:sldLayoutMk cId="1096585919" sldId="2147483853"/>
-              <ac:picMk id="5" creationId="{86FC77F9-6859-1A4D-89F3-7FB1A0E50A62}"/>
-            </ac:picMkLst>
-          </pc:picChg>
-          <pc:cxnChg chg="del">
-            <ac:chgData name="Victor Valotto" userId="f8cd04a3a901a375" providerId="LiveId" clId="{9FE5FF6C-FF80-3A42-8EBA-5C9015AF763A}" dt="2019-04-24T21:29:00.380" v="156" actId="478"/>
-            <ac:cxnSpMkLst>
-              <pc:docMk/>
-              <pc:sldMasterMk cId="0" sldId="2147483840"/>
-              <pc:sldLayoutMk cId="1096585919" sldId="2147483853"/>
-              <ac:cxnSpMk id="4" creationId="{6E4C9E35-12A6-5A4F-A587-38CBD0A4D077}"/>
-            </ac:cxnSpMkLst>
-          </pc:cxnChg>
-        </pc:sldLayoutChg>
-        <pc:sldLayoutChg chg="delSp">
-          <pc:chgData name="Victor Valotto" userId="f8cd04a3a901a375" providerId="LiveId" clId="{9FE5FF6C-FF80-3A42-8EBA-5C9015AF763A}" dt="2019-04-24T21:29:07.592" v="158" actId="478"/>
-          <pc:sldLayoutMkLst>
-            <pc:docMk/>
-            <pc:sldMasterMk cId="0" sldId="2147483840"/>
-            <pc:sldLayoutMk cId="2171198029" sldId="2147483854"/>
-          </pc:sldLayoutMkLst>
-          <pc:picChg chg="del">
-            <ac:chgData name="Victor Valotto" userId="f8cd04a3a901a375" providerId="LiveId" clId="{9FE5FF6C-FF80-3A42-8EBA-5C9015AF763A}" dt="2019-04-24T21:29:05.375" v="157" actId="478"/>
-            <ac:picMkLst>
-              <pc:docMk/>
-              <pc:sldMasterMk cId="0" sldId="2147483840"/>
-              <pc:sldLayoutMk cId="2171198029" sldId="2147483854"/>
-              <ac:picMk id="5" creationId="{5DA26B82-1812-3E4D-90BB-1F14AC95487C}"/>
-            </ac:picMkLst>
-          </pc:picChg>
-          <pc:cxnChg chg="del">
-            <ac:chgData name="Victor Valotto" userId="f8cd04a3a901a375" providerId="LiveId" clId="{9FE5FF6C-FF80-3A42-8EBA-5C9015AF763A}" dt="2019-04-24T21:29:07.592" v="158" actId="478"/>
-            <ac:cxnSpMkLst>
-              <pc:docMk/>
-              <pc:sldMasterMk cId="0" sldId="2147483840"/>
-              <pc:sldLayoutMk cId="2171198029" sldId="2147483854"/>
-              <ac:cxnSpMk id="4" creationId="{A24B5258-FFD4-6F48-931C-45C954A234D2}"/>
-            </ac:cxnSpMkLst>
-          </pc:cxnChg>
-        </pc:sldLayoutChg>
-        <pc:sldLayoutChg chg="delSp">
-          <pc:chgData name="Victor Valotto" userId="f8cd04a3a901a375" providerId="LiveId" clId="{9FE5FF6C-FF80-3A42-8EBA-5C9015AF763A}" dt="2019-04-24T21:29:15.759" v="160" actId="478"/>
-          <pc:sldLayoutMkLst>
-            <pc:docMk/>
-            <pc:sldMasterMk cId="0" sldId="2147483840"/>
-            <pc:sldLayoutMk cId="97075419" sldId="2147483855"/>
-          </pc:sldLayoutMkLst>
-          <pc:picChg chg="del">
-            <ac:chgData name="Victor Valotto" userId="f8cd04a3a901a375" providerId="LiveId" clId="{9FE5FF6C-FF80-3A42-8EBA-5C9015AF763A}" dt="2019-04-24T21:29:12.971" v="159" actId="478"/>
-            <ac:picMkLst>
-              <pc:docMk/>
-              <pc:sldMasterMk cId="0" sldId="2147483840"/>
-              <pc:sldLayoutMk cId="97075419" sldId="2147483855"/>
-              <ac:picMk id="6" creationId="{7925836C-511D-0B48-86B1-17178C8CCF07}"/>
-            </ac:picMkLst>
-          </pc:picChg>
-          <pc:cxnChg chg="del">
-            <ac:chgData name="Victor Valotto" userId="f8cd04a3a901a375" providerId="LiveId" clId="{9FE5FF6C-FF80-3A42-8EBA-5C9015AF763A}" dt="2019-04-24T21:29:15.759" v="160" actId="478"/>
-            <ac:cxnSpMkLst>
-              <pc:docMk/>
-              <pc:sldMasterMk cId="0" sldId="2147483840"/>
-              <pc:sldLayoutMk cId="97075419" sldId="2147483855"/>
-              <ac:cxnSpMk id="5" creationId="{6B6EBF95-ACDC-AA41-85BA-EA0431490402}"/>
-            </ac:cxnSpMkLst>
-          </pc:cxnChg>
-        </pc:sldLayoutChg>
-        <pc:sldLayoutChg chg="del">
-          <pc:chgData name="Victor Valotto" userId="f8cd04a3a901a375" providerId="LiveId" clId="{9FE5FF6C-FF80-3A42-8EBA-5C9015AF763A}" dt="2019-04-24T21:59:03.681" v="243" actId="2696"/>
-          <pc:sldLayoutMkLst>
-            <pc:docMk/>
-            <pc:sldMasterMk cId="0" sldId="2147483840"/>
-            <pc:sldLayoutMk cId="42184415" sldId="2147483859"/>
-          </pc:sldLayoutMkLst>
-        </pc:sldLayoutChg>
-        <pc:sldLayoutChg chg="del">
-          <pc:chgData name="Victor Valotto" userId="f8cd04a3a901a375" providerId="LiveId" clId="{9FE5FF6C-FF80-3A42-8EBA-5C9015AF763A}" dt="2019-04-24T21:59:05.688" v="245" actId="2696"/>
-          <pc:sldLayoutMkLst>
-            <pc:docMk/>
-            <pc:sldMasterMk cId="0" sldId="2147483840"/>
-            <pc:sldLayoutMk cId="771378981" sldId="2147483860"/>
-          </pc:sldLayoutMkLst>
-        </pc:sldLayoutChg>
-        <pc:sldLayoutChg chg="del">
-          <pc:chgData name="Victor Valotto" userId="f8cd04a3a901a375" providerId="LiveId" clId="{9FE5FF6C-FF80-3A42-8EBA-5C9015AF763A}" dt="2019-04-24T22:36:17.051" v="284" actId="2696"/>
-          <pc:sldLayoutMkLst>
-            <pc:docMk/>
-            <pc:sldMasterMk cId="0" sldId="2147483840"/>
-            <pc:sldLayoutMk cId="2144680236" sldId="2147483869"/>
-          </pc:sldLayoutMkLst>
-        </pc:sldLayoutChg>
-      </pc:sldMasterChg>
-    </pc:docChg>
-  </pc:docChgLst>
-  <pc:docChgLst>
-    <pc:chgData name="Victor Valotto" userId="f8cd04a3a901a375" providerId="LiveId" clId="{5A345204-3C57-C94C-B1A3-E23824FCEA03}"/>
-    <pc:docChg chg="undo custSel addSld delSld modSld">
-      <pc:chgData name="Victor Valotto" userId="f8cd04a3a901a375" providerId="LiveId" clId="{5A345204-3C57-C94C-B1A3-E23824FCEA03}" dt="2019-04-16T20:07:52.625" v="220" actId="1076"/>
-      <pc:docMkLst>
-        <pc:docMk/>
-      </pc:docMkLst>
     </pc:docChg>
   </pc:docChgLst>
 </pc:chgInfo>
@@ -4505,7 +3020,7 @@
           <a:p>
             <a:fld id="{FCD5C82B-EBA5-0F4A-84B0-95236E926059}" type="datetimeFigureOut">
               <a:rPr lang="es-AR" smtClean="0"/>
-              <a:t>25/4/19</a:t>
+              <a:t>2/6/19</a:t>
             </a:fld>
             <a:endParaRPr lang="es-AR"/>
           </a:p>
@@ -8162,7 +6677,7 @@
           <a:p>
             <a:fld id="{5A8CC0B5-6BC3-C84F-8F54-9B398EF3DA59}" type="datetime1">
               <a:rPr lang="es-AR" smtClean="0"/>
-              <a:t>25/4/19</a:t>
+              <a:t>2/6/19</a:t>
             </a:fld>
             <a:endParaRPr lang="en-US" dirty="0"/>
           </a:p>
@@ -8328,7 +6843,7 @@
           <a:p>
             <a:fld id="{C59214C8-AED1-2141-8518-C498EA3FCDAB}" type="datetime1">
               <a:rPr lang="es-AR" smtClean="0"/>
-              <a:t>25/4/19</a:t>
+              <a:t>2/6/19</a:t>
             </a:fld>
             <a:endParaRPr lang="en-US" dirty="0"/>
           </a:p>
@@ -8504,7 +7019,7 @@
           <a:p>
             <a:fld id="{1659E45A-9617-FD48-BF6D-537BAF27EA62}" type="datetime1">
               <a:rPr lang="es-AR" smtClean="0"/>
-              <a:t>25/4/19</a:t>
+              <a:t>2/6/19</a:t>
             </a:fld>
             <a:endParaRPr lang="en-US" dirty="0"/>
           </a:p>
@@ -8670,7 +7185,7 @@
           <a:p>
             <a:fld id="{5FBFCB70-AD41-8840-A490-6D7CFAB5102F}" type="datetime1">
               <a:rPr lang="es-AR" smtClean="0"/>
-              <a:t>25/4/19</a:t>
+              <a:t>2/6/19</a:t>
             </a:fld>
             <a:endParaRPr lang="en-US" dirty="0"/>
           </a:p>
@@ -8924,7 +7439,7 @@
           <a:p>
             <a:fld id="{4ACB4E37-CF02-0048-A514-3B214D6E5E55}" type="datetime1">
               <a:rPr lang="es-AR" smtClean="0"/>
-              <a:t>25/4/19</a:t>
+              <a:t>2/6/19</a:t>
             </a:fld>
             <a:endParaRPr lang="en-US" dirty="0"/>
           </a:p>
@@ -9208,7 +7723,7 @@
           <a:p>
             <a:fld id="{8FE2C218-6F2A-2241-860B-758F2713E4F1}" type="datetime1">
               <a:rPr lang="es-AR" smtClean="0"/>
-              <a:t>25/4/19</a:t>
+              <a:t>2/6/19</a:t>
             </a:fld>
             <a:endParaRPr lang="en-US" dirty="0"/>
           </a:p>
@@ -9646,7 +8161,7 @@
           <a:p>
             <a:fld id="{4AEB6E7E-096B-A640-BB45-D986AC742CAB}" type="datetime1">
               <a:rPr lang="es-AR" smtClean="0"/>
-              <a:t>25/4/19</a:t>
+              <a:t>2/6/19</a:t>
             </a:fld>
             <a:endParaRPr lang="en-US" dirty="0"/>
           </a:p>
@@ -9760,7 +8275,7 @@
           <a:p>
             <a:fld id="{9C6B0780-BEE1-4A41-B50E-A83D679F3F91}" type="datetime1">
               <a:rPr lang="es-AR" smtClean="0"/>
-              <a:t>25/4/19</a:t>
+              <a:t>2/6/19</a:t>
             </a:fld>
             <a:endParaRPr lang="en-US" dirty="0"/>
           </a:p>
@@ -9851,7 +8366,7 @@
           <a:p>
             <a:fld id="{D6E6F094-CACB-F84E-AAF7-35A67BD73968}" type="datetime1">
               <a:rPr lang="es-AR" smtClean="0"/>
-              <a:t>25/4/19</a:t>
+              <a:t>2/6/19</a:t>
             </a:fld>
             <a:endParaRPr lang="en-US" dirty="0"/>
           </a:p>
@@ -10135,7 +8650,7 @@
           <a:p>
             <a:fld id="{F2536A63-D478-264D-B44D-5DDE4C942B26}" type="datetime1">
               <a:rPr lang="es-AR" smtClean="0"/>
-              <a:t>25/4/19</a:t>
+              <a:t>2/6/19</a:t>
             </a:fld>
             <a:endParaRPr lang="en-US" dirty="0"/>
           </a:p>
@@ -10404,7 +8919,7 @@
           <a:p>
             <a:fld id="{C708D9B4-8395-B546-B98C-7E9A1A02F45C}" type="datetime1">
               <a:rPr lang="es-AR" smtClean="0"/>
-              <a:t>25/4/19</a:t>
+              <a:t>2/6/19</a:t>
             </a:fld>
             <a:endParaRPr lang="en-US" dirty="0"/>
           </a:p>
@@ -10697,7 +9212,7 @@
           <a:p>
             <a:fld id="{ACDAD340-14F1-9440-8997-1614AF599595}" type="datetime1">
               <a:rPr lang="es-AR" smtClean="0"/>
-              <a:t>25/4/19</a:t>
+              <a:t>2/6/19</a:t>
             </a:fld>
             <a:endParaRPr lang="en-US" dirty="0"/>
           </a:p>
@@ -11197,7 +9712,10 @@
           <a:bodyPr/>
           <a:lstStyle/>
           <a:p>
-            <a:endParaRPr lang="es-AR"/>
+            <a:r>
+              <a:rPr lang="es-AR" dirty="0"/>
+              <a:t>Administración de la Configuración</a:t>
+            </a:r>
           </a:p>
         </p:txBody>
       </p:sp>
@@ -11427,7 +9945,7 @@
           <a:p>
             <a:fld id="{EB7486CE-3996-0F4A-99FF-63CDAF73E2AD}" type="datetime1">
               <a:rPr lang="es-AR" smtClean="0"/>
-              <a:t>25/4/19</a:t>
+              <a:t>2/6/19</a:t>
             </a:fld>
             <a:endParaRPr lang="es-AR"/>
           </a:p>
@@ -11626,7 +10144,7 @@
           <a:p>
             <a:fld id="{EB7486CE-3996-0F4A-99FF-63CDAF73E2AD}" type="datetime1">
               <a:rPr lang="es-AR" smtClean="0"/>
-              <a:t>25/4/19</a:t>
+              <a:t>2/6/19</a:t>
             </a:fld>
             <a:endParaRPr lang="es-AR"/>
           </a:p>
@@ -11846,7 +10364,7 @@
           <a:p>
             <a:fld id="{EB7486CE-3996-0F4A-99FF-63CDAF73E2AD}" type="datetime1">
               <a:rPr lang="es-AR" smtClean="0"/>
-              <a:t>25/4/19</a:t>
+              <a:t>2/6/19</a:t>
             </a:fld>
             <a:endParaRPr lang="es-AR"/>
           </a:p>
@@ -12078,7 +10596,7 @@
             </a:pPr>
             <a:fld id="{711F35D7-2D50-4362-9D22-4586638E1276}" type="datetime1">
               <a:rPr lang="es-AR" smtClean="0"/>
-              <a:t>25/4/19</a:t>
+              <a:t>2/6/19</a:t>
             </a:fld>
             <a:endParaRPr lang="es-AR"/>
           </a:p>
@@ -13839,7 +12357,7 @@
             </a:pPr>
             <a:fld id="{BDB55EB6-DC89-4B82-A091-6AE95FEAC553}" type="datetime1">
               <a:rPr lang="es-AR" smtClean="0"/>
-              <a:t>25/4/19</a:t>
+              <a:t>2/6/19</a:t>
             </a:fld>
             <a:endParaRPr lang="es-AR"/>
           </a:p>
@@ -15572,7 +14090,7 @@
           <a:p>
             <a:fld id="{EB7486CE-3996-0F4A-99FF-63CDAF73E2AD}" type="datetime1">
               <a:rPr lang="es-AR" smtClean="0"/>
-              <a:t>25/4/19</a:t>
+              <a:t>2/6/19</a:t>
             </a:fld>
             <a:endParaRPr lang="es-AR"/>
           </a:p>
@@ -17434,7 +15952,7 @@
           <a:p>
             <a:fld id="{EB7486CE-3996-0F4A-99FF-63CDAF73E2AD}" type="datetime1">
               <a:rPr lang="es-AR" smtClean="0"/>
-              <a:t>25/4/19</a:t>
+              <a:t>2/6/19</a:t>
             </a:fld>
             <a:endParaRPr lang="es-AR"/>
           </a:p>
@@ -18923,7 +17441,7 @@
           <a:p>
             <a:fld id="{EB7486CE-3996-0F4A-99FF-63CDAF73E2AD}" type="datetime1">
               <a:rPr lang="es-AR" smtClean="0"/>
-              <a:t>25/4/19</a:t>
+              <a:t>2/6/19</a:t>
             </a:fld>
             <a:endParaRPr lang="es-AR"/>
           </a:p>
@@ -20408,7 +18926,7 @@
           <a:p>
             <a:fld id="{EB7486CE-3996-0F4A-99FF-63CDAF73E2AD}" type="datetime1">
               <a:rPr lang="es-AR" smtClean="0"/>
-              <a:t>25/4/19</a:t>
+              <a:t>2/6/19</a:t>
             </a:fld>
             <a:endParaRPr lang="es-AR"/>
           </a:p>
@@ -23033,7 +21551,7 @@
           <a:p>
             <a:fld id="{EB7486CE-3996-0F4A-99FF-63CDAF73E2AD}" type="datetime1">
               <a:rPr lang="es-AR" smtClean="0"/>
-              <a:t>25/4/19</a:t>
+              <a:t>2/6/19</a:t>
             </a:fld>
             <a:endParaRPr lang="es-AR"/>
           </a:p>
@@ -24260,7 +22778,7 @@
           <a:p>
             <a:fld id="{EB7486CE-3996-0F4A-99FF-63CDAF73E2AD}" type="datetime1">
               <a:rPr lang="es-AR" smtClean="0"/>
-              <a:t>25/4/19</a:t>
+              <a:t>2/6/19</a:t>
             </a:fld>
             <a:endParaRPr lang="es-AR"/>
           </a:p>
@@ -24513,7 +23031,7 @@
           <a:p>
             <a:fld id="{EB7486CE-3996-0F4A-99FF-63CDAF73E2AD}" type="datetime1">
               <a:rPr lang="es-AR" smtClean="0"/>
-              <a:t>25/4/19</a:t>
+              <a:t>2/6/19</a:t>
             </a:fld>
             <a:endParaRPr lang="es-AR"/>
           </a:p>
@@ -24696,7 +23214,7 @@
           <a:p>
             <a:fld id="{EB7486CE-3996-0F4A-99FF-63CDAF73E2AD}" type="datetime1">
               <a:rPr lang="es-AR" smtClean="0"/>
-              <a:t>25/4/19</a:t>
+              <a:t>2/6/19</a:t>
             </a:fld>
             <a:endParaRPr lang="es-AR"/>
           </a:p>
@@ -24930,7 +23448,7 @@
           <a:p>
             <a:fld id="{EB7486CE-3996-0F4A-99FF-63CDAF73E2AD}" type="datetime1">
               <a:rPr lang="es-AR" smtClean="0"/>
-              <a:t>25/4/19</a:t>
+              <a:t>2/6/19</a:t>
             </a:fld>
             <a:endParaRPr lang="es-AR"/>
           </a:p>
@@ -25101,7 +23619,7 @@
           <a:p>
             <a:fld id="{EB7486CE-3996-0F4A-99FF-63CDAF73E2AD}" type="datetime1">
               <a:rPr lang="es-AR" smtClean="0"/>
-              <a:t>25/4/19</a:t>
+              <a:t>2/6/19</a:t>
             </a:fld>
             <a:endParaRPr lang="es-AR"/>
           </a:p>
@@ -25300,7 +23818,7 @@
           <a:p>
             <a:fld id="{EB7486CE-3996-0F4A-99FF-63CDAF73E2AD}" type="datetime1">
               <a:rPr lang="es-AR" smtClean="0"/>
-              <a:t>25/4/19</a:t>
+              <a:t>2/6/19</a:t>
             </a:fld>
             <a:endParaRPr lang="es-AR"/>
           </a:p>
@@ -25514,7 +24032,7 @@
           <a:p>
             <a:fld id="{EB7486CE-3996-0F4A-99FF-63CDAF73E2AD}" type="datetime1">
               <a:rPr lang="es-AR" smtClean="0"/>
-              <a:t>25/4/19</a:t>
+              <a:t>2/6/19</a:t>
             </a:fld>
             <a:endParaRPr lang="es-AR"/>
           </a:p>
@@ -25743,7 +24261,7 @@
           <a:p>
             <a:fld id="{EB7486CE-3996-0F4A-99FF-63CDAF73E2AD}" type="datetime1">
               <a:rPr lang="es-AR" smtClean="0"/>
-              <a:t>25/4/19</a:t>
+              <a:t>2/6/19</a:t>
             </a:fld>
             <a:endParaRPr lang="es-AR"/>
           </a:p>
@@ -26011,7 +24529,7 @@
           <a:p>
             <a:fld id="{EB7486CE-3996-0F4A-99FF-63CDAF73E2AD}" type="datetime1">
               <a:rPr lang="es-AR" smtClean="0"/>
-              <a:t>25/4/19</a:t>
+              <a:t>2/6/19</a:t>
             </a:fld>
             <a:endParaRPr lang="es-AR"/>
           </a:p>
@@ -26283,7 +24801,7 @@
           <a:p>
             <a:fld id="{EB7486CE-3996-0F4A-99FF-63CDAF73E2AD}" type="datetime1">
               <a:rPr lang="es-AR" smtClean="0"/>
-              <a:t>25/4/19</a:t>
+              <a:t>2/6/19</a:t>
             </a:fld>
             <a:endParaRPr lang="es-AR"/>
           </a:p>
@@ -27362,7 +25880,7 @@
           <a:p>
             <a:fld id="{EB7486CE-3996-0F4A-99FF-63CDAF73E2AD}" type="datetime1">
               <a:rPr lang="es-AR" smtClean="0"/>
-              <a:t>25/4/19</a:t>
+              <a:t>2/6/19</a:t>
             </a:fld>
             <a:endParaRPr lang="es-AR"/>
           </a:p>
@@ -28088,7 +26606,7 @@
           <a:p>
             <a:fld id="{EB7486CE-3996-0F4A-99FF-63CDAF73E2AD}" type="datetime1">
               <a:rPr lang="es-AR" smtClean="0"/>
-              <a:t>25/4/19</a:t>
+              <a:t>2/6/19</a:t>
             </a:fld>
             <a:endParaRPr lang="es-AR"/>
           </a:p>
@@ -28323,7 +26841,7 @@
           <a:p>
             <a:fld id="{EB7486CE-3996-0F4A-99FF-63CDAF73E2AD}" type="datetime1">
               <a:rPr lang="es-AR" smtClean="0"/>
-              <a:t>25/4/19</a:t>
+              <a:t>2/6/19</a:t>
             </a:fld>
             <a:endParaRPr lang="es-AR"/>
           </a:p>
@@ -30792,7 +29310,7 @@
           <a:p>
             <a:fld id="{EB7486CE-3996-0F4A-99FF-63CDAF73E2AD}" type="datetime1">
               <a:rPr lang="es-AR" smtClean="0"/>
-              <a:t>25/4/19</a:t>
+              <a:t>2/6/19</a:t>
             </a:fld>
             <a:endParaRPr lang="es-AR"/>
           </a:p>
@@ -32174,7 +30692,7 @@
             </a:pPr>
             <a:fld id="{8F6D2C88-1FF7-4242-B18B-5C25CC7ED3A6}" type="datetime1">
               <a:rPr lang="es-AR" smtClean="0"/>
-              <a:t>25/4/19</a:t>
+              <a:t>2/6/19</a:t>
             </a:fld>
             <a:endParaRPr lang="es-AR"/>
           </a:p>
@@ -32417,7 +30935,7 @@
             </a:pPr>
             <a:fld id="{C45DE043-3791-4B68-AF48-25ABFB57342F}" type="datetime1">
               <a:rPr lang="es-AR" smtClean="0"/>
-              <a:t>25/4/19</a:t>
+              <a:t>2/6/19</a:t>
             </a:fld>
             <a:endParaRPr lang="es-AR"/>
           </a:p>
@@ -32563,7 +31081,7 @@
           <a:p>
             <a:fld id="{EB7486CE-3996-0F4A-99FF-63CDAF73E2AD}" type="datetime1">
               <a:rPr lang="es-AR" smtClean="0"/>
-              <a:t>25/4/19</a:t>
+              <a:t>2/6/19</a:t>
             </a:fld>
             <a:endParaRPr lang="es-AR"/>
           </a:p>
@@ -32780,7 +31298,7 @@
           <a:p>
             <a:fld id="{EB7486CE-3996-0F4A-99FF-63CDAF73E2AD}" type="datetime1">
               <a:rPr lang="es-AR" smtClean="0"/>
-              <a:t>25/4/19</a:t>
+              <a:t>2/6/19</a:t>
             </a:fld>
             <a:endParaRPr lang="es-AR"/>
           </a:p>
@@ -33263,7 +31781,7 @@
           <a:p>
             <a:fld id="{EB7486CE-3996-0F4A-99FF-63CDAF73E2AD}" type="datetime1">
               <a:rPr lang="es-AR" smtClean="0"/>
-              <a:t>25/4/19</a:t>
+              <a:t>2/6/19</a:t>
             </a:fld>
             <a:endParaRPr lang="es-AR"/>
           </a:p>
@@ -33427,7 +31945,7 @@
           <a:p>
             <a:fld id="{EB7486CE-3996-0F4A-99FF-63CDAF73E2AD}" type="datetime1">
               <a:rPr lang="es-AR" smtClean="0"/>
-              <a:t>25/4/19</a:t>
+              <a:t>2/6/19</a:t>
             </a:fld>
             <a:endParaRPr lang="es-AR"/>
           </a:p>
@@ -33535,7 +32053,7 @@
           <a:p>
             <a:fld id="{73452E24-E0A0-5F46-B617-998431C034B4}" type="datetime1">
               <a:rPr lang="es-AR" smtClean="0"/>
-              <a:t>25/4/19</a:t>
+              <a:t>2/6/19</a:t>
             </a:fld>
             <a:endParaRPr lang="es-AR"/>
           </a:p>
@@ -33814,7 +32332,7 @@
           <a:p>
             <a:fld id="{EB7486CE-3996-0F4A-99FF-63CDAF73E2AD}" type="datetime1">
               <a:rPr lang="es-AR" smtClean="0"/>
-              <a:t>25/4/19</a:t>
+              <a:t>2/6/19</a:t>
             </a:fld>
             <a:endParaRPr lang="es-AR"/>
           </a:p>
@@ -34058,7 +32576,7 @@
           <a:p>
             <a:fld id="{EB7486CE-3996-0F4A-99FF-63CDAF73E2AD}" type="datetime1">
               <a:rPr lang="es-AR" smtClean="0"/>
-              <a:t>25/4/19</a:t>
+              <a:t>2/6/19</a:t>
             </a:fld>
             <a:endParaRPr lang="es-AR"/>
           </a:p>
@@ -34708,7 +33226,7 @@
           <a:p>
             <a:fld id="{EB7486CE-3996-0F4A-99FF-63CDAF73E2AD}" type="datetime1">
               <a:rPr lang="es-AR" smtClean="0"/>
-              <a:t>25/4/19</a:t>
+              <a:t>2/6/19</a:t>
             </a:fld>
             <a:endParaRPr lang="es-AR"/>
           </a:p>
@@ -36629,7 +35147,7 @@
             </a:pPr>
             <a:fld id="{5BD058D4-368F-4825-BDA8-E23F4C522F6C}" type="datetime1">
               <a:rPr lang="es-AR" smtClean="0"/>
-              <a:t>25/4/19</a:t>
+              <a:t>2/6/19</a:t>
             </a:fld>
             <a:endParaRPr lang="es-AR"/>
           </a:p>
@@ -38197,7 +36715,7 @@
           <a:p>
             <a:fld id="{EB7486CE-3996-0F4A-99FF-63CDAF73E2AD}" type="datetime1">
               <a:rPr lang="es-AR" smtClean="0"/>
-              <a:t>25/4/19</a:t>
+              <a:t>2/6/19</a:t>
             </a:fld>
             <a:endParaRPr lang="es-AR"/>
           </a:p>
@@ -38734,7 +37252,7 @@
           <a:p>
             <a:fld id="{EB7486CE-3996-0F4A-99FF-63CDAF73E2AD}" type="datetime1">
               <a:rPr lang="es-AR" smtClean="0"/>
-              <a:t>25/4/19</a:t>
+              <a:t>2/6/19</a:t>
             </a:fld>
             <a:endParaRPr lang="es-AR"/>
           </a:p>

</xml_diff>

<commit_message>
Pruebas de Caja Negra y Blanca, pruebas unitarias
</commit_message>
<xml_diff>
--- a/06 - IS - Administracion de la configuración .pptx
+++ b/06 - IS - Administracion de la configuración .pptx
@@ -195,7 +195,7 @@
   <pc:docChgLst>
     <pc:chgData name="Victor Valotto" userId="f8cd04a3a901a375" providerId="LiveId" clId="{D8253574-1F1D-A54A-8107-1243FF27A437}"/>
     <pc:docChg chg="modSld">
-      <pc:chgData name="Victor Valotto" userId="f8cd04a3a901a375" providerId="LiveId" clId="{D8253574-1F1D-A54A-8107-1243FF27A437}" dt="2019-06-02T20:06:26.880" v="39" actId="20577"/>
+      <pc:chgData name="Victor Valotto" userId="f8cd04a3a901a375" providerId="LiveId" clId="{D8253574-1F1D-A54A-8107-1243FF27A437}" dt="2019-07-01T22:51:37.550" v="40" actId="1076"/>
       <pc:docMkLst>
         <pc:docMk/>
       </pc:docMkLst>
@@ -211,6 +211,21 @@
             <pc:docMk/>
             <pc:sldMk cId="4143034434" sldId="256"/>
             <ac:spMk id="2" creationId="{E87BCC9F-5D7D-FF4D-8BE0-02DB4CF4979F}"/>
+          </ac:spMkLst>
+        </pc:spChg>
+      </pc:sldChg>
+      <pc:sldChg chg="modSp">
+        <pc:chgData name="Victor Valotto" userId="f8cd04a3a901a375" providerId="LiveId" clId="{D8253574-1F1D-A54A-8107-1243FF27A437}" dt="2019-07-01T22:51:37.550" v="40" actId="1076"/>
+        <pc:sldMkLst>
+          <pc:docMk/>
+          <pc:sldMk cId="1487537487" sldId="304"/>
+        </pc:sldMkLst>
+        <pc:spChg chg="mod">
+          <ac:chgData name="Victor Valotto" userId="f8cd04a3a901a375" providerId="LiveId" clId="{D8253574-1F1D-A54A-8107-1243FF27A437}" dt="2019-07-01T22:51:37.550" v="40" actId="1076"/>
+          <ac:spMkLst>
+            <pc:docMk/>
+            <pc:sldMk cId="1487537487" sldId="304"/>
+            <ac:spMk id="13315" creationId="{00000000-0000-0000-0000-000000000000}"/>
           </ac:spMkLst>
         </pc:spChg>
       </pc:sldChg>
@@ -3020,7 +3035,7 @@
           <a:p>
             <a:fld id="{FCD5C82B-EBA5-0F4A-84B0-95236E926059}" type="datetimeFigureOut">
               <a:rPr lang="es-AR" smtClean="0"/>
-              <a:t>2/6/19</a:t>
+              <a:t>1/7/19</a:t>
             </a:fld>
             <a:endParaRPr lang="es-AR"/>
           </a:p>
@@ -6677,7 +6692,7 @@
           <a:p>
             <a:fld id="{5A8CC0B5-6BC3-C84F-8F54-9B398EF3DA59}" type="datetime1">
               <a:rPr lang="es-AR" smtClean="0"/>
-              <a:t>2/6/19</a:t>
+              <a:t>1/7/19</a:t>
             </a:fld>
             <a:endParaRPr lang="en-US" dirty="0"/>
           </a:p>
@@ -6843,7 +6858,7 @@
           <a:p>
             <a:fld id="{C59214C8-AED1-2141-8518-C498EA3FCDAB}" type="datetime1">
               <a:rPr lang="es-AR" smtClean="0"/>
-              <a:t>2/6/19</a:t>
+              <a:t>1/7/19</a:t>
             </a:fld>
             <a:endParaRPr lang="en-US" dirty="0"/>
           </a:p>
@@ -7019,7 +7034,7 @@
           <a:p>
             <a:fld id="{1659E45A-9617-FD48-BF6D-537BAF27EA62}" type="datetime1">
               <a:rPr lang="es-AR" smtClean="0"/>
-              <a:t>2/6/19</a:t>
+              <a:t>1/7/19</a:t>
             </a:fld>
             <a:endParaRPr lang="en-US" dirty="0"/>
           </a:p>
@@ -7185,7 +7200,7 @@
           <a:p>
             <a:fld id="{5FBFCB70-AD41-8840-A490-6D7CFAB5102F}" type="datetime1">
               <a:rPr lang="es-AR" smtClean="0"/>
-              <a:t>2/6/19</a:t>
+              <a:t>1/7/19</a:t>
             </a:fld>
             <a:endParaRPr lang="en-US" dirty="0"/>
           </a:p>
@@ -7439,7 +7454,7 @@
           <a:p>
             <a:fld id="{4ACB4E37-CF02-0048-A514-3B214D6E5E55}" type="datetime1">
               <a:rPr lang="es-AR" smtClean="0"/>
-              <a:t>2/6/19</a:t>
+              <a:t>1/7/19</a:t>
             </a:fld>
             <a:endParaRPr lang="en-US" dirty="0"/>
           </a:p>
@@ -7723,7 +7738,7 @@
           <a:p>
             <a:fld id="{8FE2C218-6F2A-2241-860B-758F2713E4F1}" type="datetime1">
               <a:rPr lang="es-AR" smtClean="0"/>
-              <a:t>2/6/19</a:t>
+              <a:t>1/7/19</a:t>
             </a:fld>
             <a:endParaRPr lang="en-US" dirty="0"/>
           </a:p>
@@ -8161,7 +8176,7 @@
           <a:p>
             <a:fld id="{4AEB6E7E-096B-A640-BB45-D986AC742CAB}" type="datetime1">
               <a:rPr lang="es-AR" smtClean="0"/>
-              <a:t>2/6/19</a:t>
+              <a:t>1/7/19</a:t>
             </a:fld>
             <a:endParaRPr lang="en-US" dirty="0"/>
           </a:p>
@@ -8275,7 +8290,7 @@
           <a:p>
             <a:fld id="{9C6B0780-BEE1-4A41-B50E-A83D679F3F91}" type="datetime1">
               <a:rPr lang="es-AR" smtClean="0"/>
-              <a:t>2/6/19</a:t>
+              <a:t>1/7/19</a:t>
             </a:fld>
             <a:endParaRPr lang="en-US" dirty="0"/>
           </a:p>
@@ -8366,7 +8381,7 @@
           <a:p>
             <a:fld id="{D6E6F094-CACB-F84E-AAF7-35A67BD73968}" type="datetime1">
               <a:rPr lang="es-AR" smtClean="0"/>
-              <a:t>2/6/19</a:t>
+              <a:t>1/7/19</a:t>
             </a:fld>
             <a:endParaRPr lang="en-US" dirty="0"/>
           </a:p>
@@ -8650,7 +8665,7 @@
           <a:p>
             <a:fld id="{F2536A63-D478-264D-B44D-5DDE4C942B26}" type="datetime1">
               <a:rPr lang="es-AR" smtClean="0"/>
-              <a:t>2/6/19</a:t>
+              <a:t>1/7/19</a:t>
             </a:fld>
             <a:endParaRPr lang="en-US" dirty="0"/>
           </a:p>
@@ -8919,7 +8934,7 @@
           <a:p>
             <a:fld id="{C708D9B4-8395-B546-B98C-7E9A1A02F45C}" type="datetime1">
               <a:rPr lang="es-AR" smtClean="0"/>
-              <a:t>2/6/19</a:t>
+              <a:t>1/7/19</a:t>
             </a:fld>
             <a:endParaRPr lang="en-US" dirty="0"/>
           </a:p>
@@ -9212,7 +9227,7 @@
           <a:p>
             <a:fld id="{ACDAD340-14F1-9440-8997-1614AF599595}" type="datetime1">
               <a:rPr lang="es-AR" smtClean="0"/>
-              <a:t>2/6/19</a:t>
+              <a:t>1/7/19</a:t>
             </a:fld>
             <a:endParaRPr lang="en-US" dirty="0"/>
           </a:p>
@@ -9945,7 +9960,7 @@
           <a:p>
             <a:fld id="{EB7486CE-3996-0F4A-99FF-63CDAF73E2AD}" type="datetime1">
               <a:rPr lang="es-AR" smtClean="0"/>
-              <a:t>2/6/19</a:t>
+              <a:t>1/7/19</a:t>
             </a:fld>
             <a:endParaRPr lang="es-AR"/>
           </a:p>
@@ -10144,7 +10159,7 @@
           <a:p>
             <a:fld id="{EB7486CE-3996-0F4A-99FF-63CDAF73E2AD}" type="datetime1">
               <a:rPr lang="es-AR" smtClean="0"/>
-              <a:t>2/6/19</a:t>
+              <a:t>1/7/19</a:t>
             </a:fld>
             <a:endParaRPr lang="es-AR"/>
           </a:p>
@@ -10364,7 +10379,7 @@
           <a:p>
             <a:fld id="{EB7486CE-3996-0F4A-99FF-63CDAF73E2AD}" type="datetime1">
               <a:rPr lang="es-AR" smtClean="0"/>
-              <a:t>2/6/19</a:t>
+              <a:t>1/7/19</a:t>
             </a:fld>
             <a:endParaRPr lang="es-AR"/>
           </a:p>
@@ -10526,7 +10541,7 @@
         </p:nvSpPr>
         <p:spPr>
           <a:xfrm>
-            <a:off x="2133600" y="1524000"/>
+            <a:off x="3563815" y="1324707"/>
             <a:ext cx="8197850" cy="4572000"/>
           </a:xfrm>
         </p:spPr>
@@ -10596,7 +10611,7 @@
             </a:pPr>
             <a:fld id="{711F35D7-2D50-4362-9D22-4586638E1276}" type="datetime1">
               <a:rPr lang="es-AR" smtClean="0"/>
-              <a:t>2/6/19</a:t>
+              <a:t>1/7/19</a:t>
             </a:fld>
             <a:endParaRPr lang="es-AR"/>
           </a:p>
@@ -12357,7 +12372,7 @@
             </a:pPr>
             <a:fld id="{BDB55EB6-DC89-4B82-A091-6AE95FEAC553}" type="datetime1">
               <a:rPr lang="es-AR" smtClean="0"/>
-              <a:t>2/6/19</a:t>
+              <a:t>1/7/19</a:t>
             </a:fld>
             <a:endParaRPr lang="es-AR"/>
           </a:p>
@@ -14090,7 +14105,7 @@
           <a:p>
             <a:fld id="{EB7486CE-3996-0F4A-99FF-63CDAF73E2AD}" type="datetime1">
               <a:rPr lang="es-AR" smtClean="0"/>
-              <a:t>2/6/19</a:t>
+              <a:t>1/7/19</a:t>
             </a:fld>
             <a:endParaRPr lang="es-AR"/>
           </a:p>
@@ -15952,7 +15967,7 @@
           <a:p>
             <a:fld id="{EB7486CE-3996-0F4A-99FF-63CDAF73E2AD}" type="datetime1">
               <a:rPr lang="es-AR" smtClean="0"/>
-              <a:t>2/6/19</a:t>
+              <a:t>1/7/19</a:t>
             </a:fld>
             <a:endParaRPr lang="es-AR"/>
           </a:p>
@@ -17441,7 +17456,7 @@
           <a:p>
             <a:fld id="{EB7486CE-3996-0F4A-99FF-63CDAF73E2AD}" type="datetime1">
               <a:rPr lang="es-AR" smtClean="0"/>
-              <a:t>2/6/19</a:t>
+              <a:t>1/7/19</a:t>
             </a:fld>
             <a:endParaRPr lang="es-AR"/>
           </a:p>
@@ -18926,7 +18941,7 @@
           <a:p>
             <a:fld id="{EB7486CE-3996-0F4A-99FF-63CDAF73E2AD}" type="datetime1">
               <a:rPr lang="es-AR" smtClean="0"/>
-              <a:t>2/6/19</a:t>
+              <a:t>1/7/19</a:t>
             </a:fld>
             <a:endParaRPr lang="es-AR"/>
           </a:p>
@@ -21551,7 +21566,7 @@
           <a:p>
             <a:fld id="{EB7486CE-3996-0F4A-99FF-63CDAF73E2AD}" type="datetime1">
               <a:rPr lang="es-AR" smtClean="0"/>
-              <a:t>2/6/19</a:t>
+              <a:t>1/7/19</a:t>
             </a:fld>
             <a:endParaRPr lang="es-AR"/>
           </a:p>
@@ -22778,7 +22793,7 @@
           <a:p>
             <a:fld id="{EB7486CE-3996-0F4A-99FF-63CDAF73E2AD}" type="datetime1">
               <a:rPr lang="es-AR" smtClean="0"/>
-              <a:t>2/6/19</a:t>
+              <a:t>1/7/19</a:t>
             </a:fld>
             <a:endParaRPr lang="es-AR"/>
           </a:p>
@@ -23031,7 +23046,7 @@
           <a:p>
             <a:fld id="{EB7486CE-3996-0F4A-99FF-63CDAF73E2AD}" type="datetime1">
               <a:rPr lang="es-AR" smtClean="0"/>
-              <a:t>2/6/19</a:t>
+              <a:t>1/7/19</a:t>
             </a:fld>
             <a:endParaRPr lang="es-AR"/>
           </a:p>
@@ -23214,7 +23229,7 @@
           <a:p>
             <a:fld id="{EB7486CE-3996-0F4A-99FF-63CDAF73E2AD}" type="datetime1">
               <a:rPr lang="es-AR" smtClean="0"/>
-              <a:t>2/6/19</a:t>
+              <a:t>1/7/19</a:t>
             </a:fld>
             <a:endParaRPr lang="es-AR"/>
           </a:p>
@@ -23448,7 +23463,7 @@
           <a:p>
             <a:fld id="{EB7486CE-3996-0F4A-99FF-63CDAF73E2AD}" type="datetime1">
               <a:rPr lang="es-AR" smtClean="0"/>
-              <a:t>2/6/19</a:t>
+              <a:t>1/7/19</a:t>
             </a:fld>
             <a:endParaRPr lang="es-AR"/>
           </a:p>
@@ -23619,7 +23634,7 @@
           <a:p>
             <a:fld id="{EB7486CE-3996-0F4A-99FF-63CDAF73E2AD}" type="datetime1">
               <a:rPr lang="es-AR" smtClean="0"/>
-              <a:t>2/6/19</a:t>
+              <a:t>1/7/19</a:t>
             </a:fld>
             <a:endParaRPr lang="es-AR"/>
           </a:p>
@@ -23818,7 +23833,7 @@
           <a:p>
             <a:fld id="{EB7486CE-3996-0F4A-99FF-63CDAF73E2AD}" type="datetime1">
               <a:rPr lang="es-AR" smtClean="0"/>
-              <a:t>2/6/19</a:t>
+              <a:t>1/7/19</a:t>
             </a:fld>
             <a:endParaRPr lang="es-AR"/>
           </a:p>
@@ -24032,7 +24047,7 @@
           <a:p>
             <a:fld id="{EB7486CE-3996-0F4A-99FF-63CDAF73E2AD}" type="datetime1">
               <a:rPr lang="es-AR" smtClean="0"/>
-              <a:t>2/6/19</a:t>
+              <a:t>1/7/19</a:t>
             </a:fld>
             <a:endParaRPr lang="es-AR"/>
           </a:p>
@@ -24261,7 +24276,7 @@
           <a:p>
             <a:fld id="{EB7486CE-3996-0F4A-99FF-63CDAF73E2AD}" type="datetime1">
               <a:rPr lang="es-AR" smtClean="0"/>
-              <a:t>2/6/19</a:t>
+              <a:t>1/7/19</a:t>
             </a:fld>
             <a:endParaRPr lang="es-AR"/>
           </a:p>
@@ -24529,7 +24544,7 @@
           <a:p>
             <a:fld id="{EB7486CE-3996-0F4A-99FF-63CDAF73E2AD}" type="datetime1">
               <a:rPr lang="es-AR" smtClean="0"/>
-              <a:t>2/6/19</a:t>
+              <a:t>1/7/19</a:t>
             </a:fld>
             <a:endParaRPr lang="es-AR"/>
           </a:p>
@@ -24801,7 +24816,7 @@
           <a:p>
             <a:fld id="{EB7486CE-3996-0F4A-99FF-63CDAF73E2AD}" type="datetime1">
               <a:rPr lang="es-AR" smtClean="0"/>
-              <a:t>2/6/19</a:t>
+              <a:t>1/7/19</a:t>
             </a:fld>
             <a:endParaRPr lang="es-AR"/>
           </a:p>
@@ -25880,7 +25895,7 @@
           <a:p>
             <a:fld id="{EB7486CE-3996-0F4A-99FF-63CDAF73E2AD}" type="datetime1">
               <a:rPr lang="es-AR" smtClean="0"/>
-              <a:t>2/6/19</a:t>
+              <a:t>1/7/19</a:t>
             </a:fld>
             <a:endParaRPr lang="es-AR"/>
           </a:p>
@@ -26606,7 +26621,7 @@
           <a:p>
             <a:fld id="{EB7486CE-3996-0F4A-99FF-63CDAF73E2AD}" type="datetime1">
               <a:rPr lang="es-AR" smtClean="0"/>
-              <a:t>2/6/19</a:t>
+              <a:t>1/7/19</a:t>
             </a:fld>
             <a:endParaRPr lang="es-AR"/>
           </a:p>
@@ -26841,7 +26856,7 @@
           <a:p>
             <a:fld id="{EB7486CE-3996-0F4A-99FF-63CDAF73E2AD}" type="datetime1">
               <a:rPr lang="es-AR" smtClean="0"/>
-              <a:t>2/6/19</a:t>
+              <a:t>1/7/19</a:t>
             </a:fld>
             <a:endParaRPr lang="es-AR"/>
           </a:p>
@@ -29310,7 +29325,7 @@
           <a:p>
             <a:fld id="{EB7486CE-3996-0F4A-99FF-63CDAF73E2AD}" type="datetime1">
               <a:rPr lang="es-AR" smtClean="0"/>
-              <a:t>2/6/19</a:t>
+              <a:t>1/7/19</a:t>
             </a:fld>
             <a:endParaRPr lang="es-AR"/>
           </a:p>
@@ -30692,7 +30707,7 @@
             </a:pPr>
             <a:fld id="{8F6D2C88-1FF7-4242-B18B-5C25CC7ED3A6}" type="datetime1">
               <a:rPr lang="es-AR" smtClean="0"/>
-              <a:t>2/6/19</a:t>
+              <a:t>1/7/19</a:t>
             </a:fld>
             <a:endParaRPr lang="es-AR"/>
           </a:p>
@@ -30935,7 +30950,7 @@
             </a:pPr>
             <a:fld id="{C45DE043-3791-4B68-AF48-25ABFB57342F}" type="datetime1">
               <a:rPr lang="es-AR" smtClean="0"/>
-              <a:t>2/6/19</a:t>
+              <a:t>1/7/19</a:t>
             </a:fld>
             <a:endParaRPr lang="es-AR"/>
           </a:p>
@@ -31081,7 +31096,7 @@
           <a:p>
             <a:fld id="{EB7486CE-3996-0F4A-99FF-63CDAF73E2AD}" type="datetime1">
               <a:rPr lang="es-AR" smtClean="0"/>
-              <a:t>2/6/19</a:t>
+              <a:t>1/7/19</a:t>
             </a:fld>
             <a:endParaRPr lang="es-AR"/>
           </a:p>
@@ -31298,7 +31313,7 @@
           <a:p>
             <a:fld id="{EB7486CE-3996-0F4A-99FF-63CDAF73E2AD}" type="datetime1">
               <a:rPr lang="es-AR" smtClean="0"/>
-              <a:t>2/6/19</a:t>
+              <a:t>1/7/19</a:t>
             </a:fld>
             <a:endParaRPr lang="es-AR"/>
           </a:p>
@@ -31781,7 +31796,7 @@
           <a:p>
             <a:fld id="{EB7486CE-3996-0F4A-99FF-63CDAF73E2AD}" type="datetime1">
               <a:rPr lang="es-AR" smtClean="0"/>
-              <a:t>2/6/19</a:t>
+              <a:t>1/7/19</a:t>
             </a:fld>
             <a:endParaRPr lang="es-AR"/>
           </a:p>
@@ -31945,7 +31960,7 @@
           <a:p>
             <a:fld id="{EB7486CE-3996-0F4A-99FF-63CDAF73E2AD}" type="datetime1">
               <a:rPr lang="es-AR" smtClean="0"/>
-              <a:t>2/6/19</a:t>
+              <a:t>1/7/19</a:t>
             </a:fld>
             <a:endParaRPr lang="es-AR"/>
           </a:p>
@@ -32053,7 +32068,7 @@
           <a:p>
             <a:fld id="{73452E24-E0A0-5F46-B617-998431C034B4}" type="datetime1">
               <a:rPr lang="es-AR" smtClean="0"/>
-              <a:t>2/6/19</a:t>
+              <a:t>1/7/19</a:t>
             </a:fld>
             <a:endParaRPr lang="es-AR"/>
           </a:p>
@@ -32332,7 +32347,7 @@
           <a:p>
             <a:fld id="{EB7486CE-3996-0F4A-99FF-63CDAF73E2AD}" type="datetime1">
               <a:rPr lang="es-AR" smtClean="0"/>
-              <a:t>2/6/19</a:t>
+              <a:t>1/7/19</a:t>
             </a:fld>
             <a:endParaRPr lang="es-AR"/>
           </a:p>
@@ -32576,7 +32591,7 @@
           <a:p>
             <a:fld id="{EB7486CE-3996-0F4A-99FF-63CDAF73E2AD}" type="datetime1">
               <a:rPr lang="es-AR" smtClean="0"/>
-              <a:t>2/6/19</a:t>
+              <a:t>1/7/19</a:t>
             </a:fld>
             <a:endParaRPr lang="es-AR"/>
           </a:p>
@@ -33226,7 +33241,7 @@
           <a:p>
             <a:fld id="{EB7486CE-3996-0F4A-99FF-63CDAF73E2AD}" type="datetime1">
               <a:rPr lang="es-AR" smtClean="0"/>
-              <a:t>2/6/19</a:t>
+              <a:t>1/7/19</a:t>
             </a:fld>
             <a:endParaRPr lang="es-AR"/>
           </a:p>
@@ -35147,7 +35162,7 @@
             </a:pPr>
             <a:fld id="{5BD058D4-368F-4825-BDA8-E23F4C522F6C}" type="datetime1">
               <a:rPr lang="es-AR" smtClean="0"/>
-              <a:t>2/6/19</a:t>
+              <a:t>1/7/19</a:t>
             </a:fld>
             <a:endParaRPr lang="es-AR"/>
           </a:p>
@@ -36715,7 +36730,7 @@
           <a:p>
             <a:fld id="{EB7486CE-3996-0F4A-99FF-63CDAF73E2AD}" type="datetime1">
               <a:rPr lang="es-AR" smtClean="0"/>
-              <a:t>2/6/19</a:t>
+              <a:t>1/7/19</a:t>
             </a:fld>
             <a:endParaRPr lang="es-AR"/>
           </a:p>
@@ -37252,7 +37267,7 @@
           <a:p>
             <a:fld id="{EB7486CE-3996-0F4A-99FF-63CDAF73E2AD}" type="datetime1">
               <a:rPr lang="es-AR" smtClean="0"/>
-              <a:t>2/6/19</a:t>
+              <a:t>1/7/19</a:t>
             </a:fld>
             <a:endParaRPr lang="es-AR"/>
           </a:p>

</xml_diff>